<commit_message>
Already needed to recommit a fixed typo...
</commit_message>
<xml_diff>
--- a/Big Data Paper Summary/The Google File System PPP.pptx
+++ b/Big Data Paper Summary/The Google File System PPP.pptx
@@ -3802,7 +3802,15 @@
             </a:r>
             <a:r>
               <a:rPr lang="en-US" sz="4000" i="1" dirty="0" smtClean="0"/>
-              <a:t>A Comparison of Approaches to Large-Scale Data Analysis The Google File System  </a:t>
+              <a:t>A Comparison of Approaches to Large-Scale Data </a:t>
+            </a:r>
+            <a:r>
+              <a:rPr lang="en-US" sz="4000" i="1" smtClean="0"/>
+              <a:t>Analysis </a:t>
+            </a:r>
+            <a:r>
+              <a:rPr lang="en-US" sz="4000" i="1" dirty="0" smtClean="0"/>
+              <a:t/>
             </a:r>
             <a:br>
               <a:rPr lang="en-US" sz="4000" i="1" dirty="0" smtClean="0"/>

</xml_diff>

<commit_message>
Finished Big Data Paper!
Sorry for being a day late, Business Capping has consumed my life the
last two weeks
</commit_message>
<xml_diff>
--- a/Big Data Paper Summary/The Google File System PPP.pptx
+++ b/Big Data Paper Summary/The Google File System PPP.pptx
@@ -7,6 +7,10 @@
   <p:sldIdLst>
     <p:sldId id="256" r:id="rId2"/>
     <p:sldId id="257" r:id="rId3"/>
+    <p:sldId id="258" r:id="rId4"/>
+    <p:sldId id="259" r:id="rId5"/>
+    <p:sldId id="260" r:id="rId6"/>
+    <p:sldId id="261" r:id="rId7"/>
   </p:sldIdLst>
   <p:sldSz cx="12192000" cy="6858000"/>
   <p:notesSz cx="6858000" cy="9144000"/>
@@ -105,6 +109,11 @@
       </a:defRPr>
     </a:lvl9pPr>
   </p:defaultTextStyle>
+  <p:extLst>
+    <p:ext uri="{EFAFB233-063F-42B5-8137-9DF3F51BA10A}">
+      <p15:sldGuideLst xmlns:p15="http://schemas.microsoft.com/office/powerpoint/2012/main" xmlns=""/>
+    </p:ext>
+  </p:extLst>
 </p:presentation>
 </file>
 
@@ -334,7 +343,7 @@
           <a:p>
             <a:fld id="{4BDF68E2-58F2-4D09-BE8B-E3BD06533059}" type="datetimeFigureOut">
               <a:rPr lang="en-US" dirty="0"/>
-              <a:t>4/28/2014</a:t>
+              <a:t>5/10/2014</a:t>
             </a:fld>
             <a:endParaRPr lang="en-US" dirty="0"/>
           </a:p>
@@ -537,7 +546,7 @@
           <a:p>
             <a:fld id="{2E2D6473-DF6D-4702-B328-E0DD40540A4E}" type="datetimeFigureOut">
               <a:rPr lang="en-US" dirty="0"/>
-              <a:t>4/28/2014</a:t>
+              <a:t>5/10/2014</a:t>
             </a:fld>
             <a:endParaRPr lang="en-US" dirty="0"/>
           </a:p>
@@ -788,7 +797,7 @@
           <a:p>
             <a:fld id="{E26F7E3A-B166-407D-9866-32884E7D5B37}" type="datetimeFigureOut">
               <a:rPr lang="en-US" dirty="0"/>
-              <a:t>4/28/2014</a:t>
+              <a:t>5/10/2014</a:t>
             </a:fld>
             <a:endParaRPr lang="en-US" dirty="0"/>
           </a:p>
@@ -957,7 +966,7 @@
           <a:p>
             <a:fld id="{528FC5F6-F338-4AE4-BB23-26385BCFC423}" type="datetimeFigureOut">
               <a:rPr lang="en-US" dirty="0"/>
-              <a:t>4/28/2014</a:t>
+              <a:t>5/10/2014</a:t>
             </a:fld>
             <a:endParaRPr lang="en-US" dirty="0"/>
           </a:p>
@@ -1295,7 +1304,7 @@
           <a:p>
             <a:fld id="{20EBB0C4-6273-4C6E-B9BD-2EDC30F1CD52}" type="datetimeFigureOut">
               <a:rPr lang="en-US" dirty="0"/>
-              <a:t>4/28/2014</a:t>
+              <a:t>5/10/2014</a:t>
             </a:fld>
             <a:endParaRPr lang="en-US" dirty="0"/>
           </a:p>
@@ -1565,7 +1574,7 @@
           <a:p>
             <a:fld id="{19AB4D41-86C1-4908-B66A-0B50CEB3BF29}" type="datetimeFigureOut">
               <a:rPr lang="en-US" dirty="0"/>
-              <a:t>4/28/2014</a:t>
+              <a:t>5/10/2014</a:t>
             </a:fld>
             <a:endParaRPr lang="en-US" dirty="0"/>
           </a:p>
@@ -1939,7 +1948,7 @@
           <a:p>
             <a:fld id="{E6426E2C-56C1-4E0D-A793-0088A7FDD37E}" type="datetimeFigureOut">
               <a:rPr lang="en-US" dirty="0"/>
-              <a:t>4/28/2014</a:t>
+              <a:t>5/10/2014</a:t>
             </a:fld>
             <a:endParaRPr lang="en-US" dirty="0"/>
           </a:p>
@@ -2052,7 +2061,7 @@
           <a:p>
             <a:fld id="{C8C39B41-D8B5-4052-B551-9B5525EAA8B6}" type="datetimeFigureOut">
               <a:rPr lang="en-US" dirty="0"/>
-              <a:t>4/28/2014</a:t>
+              <a:t>5/10/2014</a:t>
             </a:fld>
             <a:endParaRPr lang="en-US" dirty="0"/>
           </a:p>
@@ -2218,7 +2227,7 @@
           <a:p>
             <a:fld id="{4D94136C-8742-45B2-AF27-D93DF72833A9}" type="datetimeFigureOut">
               <a:rPr lang="en-US" dirty="0"/>
-              <a:t>4/28/2014</a:t>
+              <a:t>5/10/2014</a:t>
             </a:fld>
             <a:endParaRPr lang="en-US" dirty="0"/>
           </a:p>
@@ -2568,7 +2577,7 @@
           <a:p>
             <a:fld id="{32ABBEA6-7C60-4B02-AE87-00D78D8422AF}" type="datetimeFigureOut">
               <a:rPr lang="en-US" dirty="0"/>
-              <a:t>4/28/2014</a:t>
+              <a:t>5/10/2014</a:t>
             </a:fld>
             <a:endParaRPr lang="en-US" dirty="0"/>
           </a:p>
@@ -2946,7 +2955,7 @@
           <a:p>
             <a:fld id="{C9CAD897-D46E-4AD2-BD9B-49DD3E640873}" type="datetimeFigureOut">
               <a:rPr lang="en-US" dirty="0"/>
-              <a:t>4/28/2014</a:t>
+              <a:t>5/10/2014</a:t>
             </a:fld>
             <a:endParaRPr lang="en-US" dirty="0"/>
           </a:p>
@@ -3228,7 +3237,7 @@
           <a:p>
             <a:fld id="{98624D31-43A5-475A-80CF-332C9F6DCF35}" type="datetimeFigureOut">
               <a:rPr lang="en-US" dirty="0"/>
-              <a:t>4/28/2014</a:t>
+              <a:t>5/10/2014</a:t>
             </a:fld>
             <a:endParaRPr lang="en-US" dirty="0"/>
           </a:p>
@@ -3762,12 +3771,12 @@
         <p:spPr/>
         <p:txBody>
           <a:bodyPr>
-            <a:normAutofit/>
+            <a:normAutofit fontScale="90000"/>
           </a:bodyPr>
           <a:lstStyle/>
           <a:p>
             <a:r>
-              <a:rPr lang="en-US" sz="5400" b="1" dirty="0" smtClean="0"/>
+              <a:rPr lang="en-US" sz="5400" b="1" i="1" dirty="0" smtClean="0"/>
               <a:t>Big Data Paper Summary: </a:t>
             </a:r>
             <a:r>
@@ -3797,20 +3806,54 @@
               <a:t> </a:t>
             </a:r>
             <a:r>
+              <a:rPr lang="en-US" sz="4000" i="1" dirty="0" smtClean="0"/>
+              <a:t>(by: Sanjay </a:t>
+            </a:r>
+            <a:r>
+              <a:rPr lang="en-US" sz="4000" i="1" dirty="0" err="1"/>
+              <a:t>Ghemawat</a:t>
+            </a:r>
+            <a:r>
+              <a:rPr lang="en-US" sz="4000" i="1" dirty="0"/>
+              <a:t>, Howard </a:t>
+            </a:r>
+            <a:r>
+              <a:rPr lang="en-US" sz="4000" i="1" dirty="0" err="1"/>
+              <a:t>Gobioff</a:t>
+            </a:r>
+            <a:r>
+              <a:rPr lang="en-US" sz="4000" i="1" dirty="0"/>
+              <a:t>, and Shun-</a:t>
+            </a:r>
+            <a:r>
+              <a:rPr lang="en-US" sz="4000" i="1" dirty="0" err="1"/>
+              <a:t>Tak</a:t>
+            </a:r>
+            <a:r>
+              <a:rPr lang="en-US" sz="4000" i="1" dirty="0"/>
+              <a:t> </a:t>
+            </a:r>
+            <a:r>
+              <a:rPr lang="en-US" sz="4000" i="1" dirty="0" smtClean="0"/>
+              <a:t>Leung)</a:t>
+            </a:r>
+            <a:br>
+              <a:rPr lang="en-US" sz="4000" i="1" dirty="0" smtClean="0"/>
+            </a:br>
+            <a:r>
               <a:rPr lang="en-US" sz="4000" b="1" dirty="0" smtClean="0"/>
               <a:t>AND </a:t>
             </a:r>
+            <a:br>
+              <a:rPr lang="en-US" sz="4000" b="1" dirty="0" smtClean="0"/>
+            </a:br>
             <a:r>
               <a:rPr lang="en-US" sz="4000" i="1" dirty="0" smtClean="0"/>
-              <a:t>A Comparison of Approaches to Large-Scale Data </a:t>
-            </a:r>
-            <a:r>
-              <a:rPr lang="en-US" sz="4000" i="1" smtClean="0"/>
-              <a:t>Analysis </a:t>
+              <a:t>A </a:t>
             </a:r>
             <a:r>
               <a:rPr lang="en-US" sz="4000" i="1" dirty="0" smtClean="0"/>
-              <a:t/>
+              <a:t>Comparison of Approaches to Large-Scale Data Analysis </a:t>
             </a:r>
             <a:br>
               <a:rPr lang="en-US" sz="4000" i="1" dirty="0" smtClean="0"/>
@@ -3913,45 +3956,207 @@
           <a:bodyPr/>
           <a:lstStyle/>
           <a:p>
+            <a:r>
+              <a:rPr lang="en-US" b="1" i="1" dirty="0" smtClean="0">
+                <a:solidFill>
+                  <a:schemeClr val="bg2">
+                    <a:lumMod val="25000"/>
+                  </a:schemeClr>
+                </a:solidFill>
+              </a:rPr>
+              <a:t>Main Idea:</a:t>
+            </a:r>
+            <a:endParaRPr lang="en-US" b="1" i="1" dirty="0">
+              <a:solidFill>
+                <a:schemeClr val="bg2">
+                  <a:lumMod val="25000"/>
+                </a:schemeClr>
+              </a:solidFill>
+            </a:endParaRPr>
+          </a:p>
+        </p:txBody>
+      </p:sp>
+      <p:sp>
+        <p:nvSpPr>
+          <p:cNvPr id="6" name="Rectangle 5"/>
+          <p:cNvSpPr/>
+          <p:nvPr/>
+        </p:nvSpPr>
+        <p:spPr>
+          <a:xfrm>
+            <a:off x="423511" y="1845734"/>
+            <a:ext cx="11405937" cy="4194119"/>
+          </a:xfrm>
+          <a:prstGeom prst="rect">
+            <a:avLst/>
+          </a:prstGeom>
+          <a:solidFill>
+            <a:schemeClr val="bg2">
+              <a:lumMod val="90000"/>
+            </a:schemeClr>
+          </a:solidFill>
+        </p:spPr>
+        <p:style>
+          <a:lnRef idx="1">
+            <a:schemeClr val="accent1"/>
+          </a:lnRef>
+          <a:fillRef idx="2">
+            <a:schemeClr val="accent1"/>
+          </a:fillRef>
+          <a:effectRef idx="1">
+            <a:schemeClr val="accent1"/>
+          </a:effectRef>
+          <a:fontRef idx="minor">
+            <a:schemeClr val="dk1"/>
+          </a:fontRef>
+        </p:style>
+        <p:txBody>
+          <a:bodyPr rtlCol="0" anchor="ctr"/>
+          <a:lstStyle/>
+          <a:p>
+            <a:pPr marL="285750" indent="-285750" algn="ctr">
+              <a:buFont typeface="Arial" panose="020B0604020202020204" pitchFamily="34" charset="0"/>
+              <a:buChar char="•"/>
+            </a:pPr>
             <a:endParaRPr lang="en-US"/>
           </a:p>
         </p:txBody>
       </p:sp>
       <p:sp>
         <p:nvSpPr>
-          <p:cNvPr id="3" name="Content Placeholder 2"/>
-          <p:cNvSpPr>
-            <a:spLocks noGrp="1"/>
-          </p:cNvSpPr>
-          <p:nvPr>
-            <p:ph sz="half" idx="1"/>
+          <p:cNvPr id="5" name="Content Placeholder 4"/>
+          <p:cNvSpPr>
+            <a:spLocks noGrp="1"/>
+          </p:cNvSpPr>
+          <p:nvPr>
+            <p:ph idx="1"/>
           </p:nvPr>
         </p:nvSpPr>
         <p:spPr/>
         <p:txBody>
-          <a:bodyPr/>
-          <a:lstStyle/>
-          <a:p>
-            <a:endParaRPr lang="en-US"/>
-          </a:p>
-        </p:txBody>
-      </p:sp>
-      <p:sp>
-        <p:nvSpPr>
-          <p:cNvPr id="4" name="Content Placeholder 3"/>
-          <p:cNvSpPr>
-            <a:spLocks noGrp="1"/>
-          </p:cNvSpPr>
-          <p:nvPr>
-            <p:ph sz="half" idx="2"/>
-          </p:nvPr>
-        </p:nvSpPr>
-        <p:spPr/>
-        <p:txBody>
-          <a:bodyPr/>
-          <a:lstStyle/>
-          <a:p>
-            <a:endParaRPr lang="en-US"/>
+          <a:bodyPr>
+            <a:normAutofit/>
+          </a:bodyPr>
+          <a:lstStyle/>
+          <a:p>
+            <a:pPr marL="0" indent="0">
+              <a:buNone/>
+            </a:pPr>
+            <a:endParaRPr lang="en-US" sz="2200" b="1" dirty="0" smtClean="0">
+              <a:solidFill>
+                <a:srgbClr val="C00000"/>
+              </a:solidFill>
+              <a:latin typeface="Times New Roman" panose="02020603050405020304" pitchFamily="18" charset="0"/>
+              <a:cs typeface="Times New Roman" panose="02020603050405020304" pitchFamily="18" charset="0"/>
+            </a:endParaRPr>
+          </a:p>
+          <a:p>
+            <a:pPr>
+              <a:buFont typeface="Wingdings" panose="05000000000000000000" pitchFamily="2" charset="2"/>
+              <a:buChar char="§"/>
+            </a:pPr>
+            <a:r>
+              <a:rPr lang="en-US" sz="2200" b="1" dirty="0" smtClean="0">
+                <a:solidFill>
+                  <a:srgbClr val="C00000"/>
+                </a:solidFill>
+                <a:latin typeface="Times New Roman" panose="02020603050405020304" pitchFamily="18" charset="0"/>
+                <a:cs typeface="Times New Roman" panose="02020603050405020304" pitchFamily="18" charset="0"/>
+              </a:rPr>
+              <a:t>Google </a:t>
+            </a:r>
+            <a:r>
+              <a:rPr lang="en-US" sz="2200" b="1" dirty="0" smtClean="0">
+                <a:solidFill>
+                  <a:srgbClr val="C00000"/>
+                </a:solidFill>
+                <a:latin typeface="Times New Roman" panose="02020603050405020304" pitchFamily="18" charset="0"/>
+                <a:cs typeface="Times New Roman" panose="02020603050405020304" pitchFamily="18" charset="0"/>
+              </a:rPr>
+              <a:t>File System (GFS) is a “scalable distribution file system for large distributed data-intensive applications</a:t>
+            </a:r>
+            <a:r>
+              <a:rPr lang="en-US" sz="2200" b="1" dirty="0" smtClean="0">
+                <a:solidFill>
+                  <a:srgbClr val="C00000"/>
+                </a:solidFill>
+                <a:latin typeface="Times New Roman" panose="02020603050405020304" pitchFamily="18" charset="0"/>
+                <a:cs typeface="Times New Roman" panose="02020603050405020304" pitchFamily="18" charset="0"/>
+              </a:rPr>
+              <a:t>.”</a:t>
+            </a:r>
+            <a:endParaRPr lang="en-US" sz="2200" b="1" dirty="0" smtClean="0">
+              <a:solidFill>
+                <a:srgbClr val="C00000"/>
+              </a:solidFill>
+              <a:latin typeface="Times New Roman" panose="02020603050405020304" pitchFamily="18" charset="0"/>
+              <a:cs typeface="Times New Roman" panose="02020603050405020304" pitchFamily="18" charset="0"/>
+            </a:endParaRPr>
+          </a:p>
+          <a:p>
+            <a:pPr>
+              <a:buFont typeface="Wingdings" panose="05000000000000000000" pitchFamily="2" charset="2"/>
+              <a:buChar char="§"/>
+            </a:pPr>
+            <a:r>
+              <a:rPr lang="en-US" sz="2200" b="1" dirty="0" smtClean="0">
+                <a:solidFill>
+                  <a:srgbClr val="C00000"/>
+                </a:solidFill>
+                <a:latin typeface="Times New Roman" panose="02020603050405020304" pitchFamily="18" charset="0"/>
+                <a:cs typeface="Times New Roman" panose="02020603050405020304" pitchFamily="18" charset="0"/>
+              </a:rPr>
+              <a:t>In </a:t>
+            </a:r>
+            <a:r>
+              <a:rPr lang="en-US" sz="2200" b="1" dirty="0" smtClean="0">
+                <a:solidFill>
+                  <a:srgbClr val="C00000"/>
+                </a:solidFill>
+                <a:latin typeface="Times New Roman" panose="02020603050405020304" pitchFamily="18" charset="0"/>
+                <a:cs typeface="Times New Roman" panose="02020603050405020304" pitchFamily="18" charset="0"/>
+              </a:rPr>
+              <a:t>other words, it is a Big Data platform/system with the goal of optimization of aggregate performance at a cost efficient hardware and software level. </a:t>
+            </a:r>
+          </a:p>
+          <a:p>
+            <a:pPr>
+              <a:buFont typeface="Wingdings" panose="05000000000000000000" pitchFamily="2" charset="2"/>
+              <a:buChar char="§"/>
+            </a:pPr>
+            <a:r>
+              <a:rPr lang="en-US" sz="2200" b="1" dirty="0" smtClean="0">
+                <a:solidFill>
+                  <a:srgbClr val="C00000"/>
+                </a:solidFill>
+                <a:latin typeface="Times New Roman" panose="02020603050405020304" pitchFamily="18" charset="0"/>
+                <a:cs typeface="Times New Roman" panose="02020603050405020304" pitchFamily="18" charset="0"/>
+              </a:rPr>
+              <a:t>GFS is able to cluster hundreds of terabytes of storage across thousands of disks and machines that are accessible by hundreds of clients. </a:t>
+            </a:r>
+          </a:p>
+          <a:p>
+            <a:pPr>
+              <a:buFont typeface="Wingdings" panose="05000000000000000000" pitchFamily="2" charset="2"/>
+              <a:buChar char="§"/>
+            </a:pPr>
+            <a:r>
+              <a:rPr lang="en-US" sz="2200" b="1" dirty="0" smtClean="0">
+                <a:solidFill>
+                  <a:srgbClr val="C00000"/>
+                </a:solidFill>
+                <a:latin typeface="Times New Roman" panose="02020603050405020304" pitchFamily="18" charset="0"/>
+                <a:cs typeface="Times New Roman" panose="02020603050405020304" pitchFamily="18" charset="0"/>
+              </a:rPr>
+              <a:t>GFS utilizes an agile architecture to help report metrics for “micro-benchmarks” and real world uses (providing metadata), while attempting to optimize the balance between performance, scalability, reliability, and availability.  </a:t>
+            </a:r>
+            <a:endParaRPr lang="en-US" sz="2200" b="1" dirty="0">
+              <a:solidFill>
+                <a:srgbClr val="C00000"/>
+              </a:solidFill>
+              <a:latin typeface="Times New Roman" panose="02020603050405020304" pitchFamily="18" charset="0"/>
+              <a:cs typeface="Times New Roman" panose="02020603050405020304" pitchFamily="18" charset="0"/>
+            </a:endParaRPr>
           </a:p>
         </p:txBody>
       </p:sp>
@@ -3959,6 +4164,1945 @@
     <p:extLst>
       <p:ext uri="{BB962C8B-B14F-4D97-AF65-F5344CB8AC3E}">
         <p14:creationId xmlns:p14="http://schemas.microsoft.com/office/powerpoint/2010/main" val="644394283"/>
+      </p:ext>
+    </p:extLst>
+  </p:cSld>
+  <p:clrMapOvr>
+    <a:masterClrMapping/>
+  </p:clrMapOvr>
+</p:sld>
+</file>
+
+<file path=ppt/slides/slide3.xml><?xml version="1.0" encoding="utf-8"?>
+<p:sld xmlns:a="http://schemas.openxmlformats.org/drawingml/2006/main" xmlns:r="http://schemas.openxmlformats.org/officeDocument/2006/relationships" xmlns:p="http://schemas.openxmlformats.org/presentationml/2006/main">
+  <p:cSld>
+    <p:spTree>
+      <p:nvGrpSpPr>
+        <p:cNvPr id="1" name=""/>
+        <p:cNvGrpSpPr/>
+        <p:nvPr/>
+      </p:nvGrpSpPr>
+      <p:grpSpPr>
+        <a:xfrm>
+          <a:off x="0" y="0"/>
+          <a:ext cx="0" cy="0"/>
+          <a:chOff x="0" y="0"/>
+          <a:chExt cx="0" cy="0"/>
+        </a:xfrm>
+      </p:grpSpPr>
+      <p:sp>
+        <p:nvSpPr>
+          <p:cNvPr id="2" name="Title 1"/>
+          <p:cNvSpPr>
+            <a:spLocks noGrp="1"/>
+          </p:cNvSpPr>
+          <p:nvPr>
+            <p:ph type="title"/>
+          </p:nvPr>
+        </p:nvSpPr>
+        <p:spPr/>
+        <p:txBody>
+          <a:bodyPr/>
+          <a:lstStyle/>
+          <a:p>
+            <a:r>
+              <a:rPr lang="en-US" b="1" i="1" dirty="0" smtClean="0">
+                <a:solidFill>
+                  <a:schemeClr val="bg2">
+                    <a:lumMod val="25000"/>
+                  </a:schemeClr>
+                </a:solidFill>
+              </a:rPr>
+              <a:t>Implementation</a:t>
+            </a:r>
+            <a:r>
+              <a:rPr lang="en-US" b="1" dirty="0" smtClean="0">
+                <a:solidFill>
+                  <a:schemeClr val="bg2">
+                    <a:lumMod val="25000"/>
+                  </a:schemeClr>
+                </a:solidFill>
+              </a:rPr>
+              <a:t>:</a:t>
+            </a:r>
+            <a:endParaRPr lang="en-US" dirty="0"/>
+          </a:p>
+        </p:txBody>
+      </p:sp>
+      <p:sp>
+        <p:nvSpPr>
+          <p:cNvPr id="4" name="Rectangle 3"/>
+          <p:cNvSpPr/>
+          <p:nvPr/>
+        </p:nvSpPr>
+        <p:spPr>
+          <a:xfrm>
+            <a:off x="423511" y="1785257"/>
+            <a:ext cx="11405937" cy="4254596"/>
+          </a:xfrm>
+          <a:prstGeom prst="rect">
+            <a:avLst/>
+          </a:prstGeom>
+          <a:solidFill>
+            <a:schemeClr val="bg2">
+              <a:lumMod val="90000"/>
+            </a:schemeClr>
+          </a:solidFill>
+        </p:spPr>
+        <p:style>
+          <a:lnRef idx="1">
+            <a:schemeClr val="accent1"/>
+          </a:lnRef>
+          <a:fillRef idx="2">
+            <a:schemeClr val="accent1"/>
+          </a:fillRef>
+          <a:effectRef idx="1">
+            <a:schemeClr val="accent1"/>
+          </a:effectRef>
+          <a:fontRef idx="minor">
+            <a:schemeClr val="dk1"/>
+          </a:fontRef>
+        </p:style>
+        <p:txBody>
+          <a:bodyPr rtlCol="0" anchor="ctr"/>
+          <a:lstStyle/>
+          <a:p>
+            <a:pPr marL="285750" indent="-285750" algn="ctr">
+              <a:buFont typeface="Arial" panose="020B0604020202020204" pitchFamily="34" charset="0"/>
+              <a:buChar char="•"/>
+            </a:pPr>
+            <a:endParaRPr lang="en-US"/>
+          </a:p>
+        </p:txBody>
+      </p:sp>
+      <p:sp>
+        <p:nvSpPr>
+          <p:cNvPr id="3" name="Content Placeholder 2"/>
+          <p:cNvSpPr>
+            <a:spLocks noGrp="1"/>
+          </p:cNvSpPr>
+          <p:nvPr>
+            <p:ph idx="1"/>
+          </p:nvPr>
+        </p:nvSpPr>
+        <p:spPr>
+          <a:xfrm>
+            <a:off x="1097279" y="1845734"/>
+            <a:ext cx="10732169" cy="4023360"/>
+          </a:xfrm>
+        </p:spPr>
+        <p:txBody>
+          <a:bodyPr>
+            <a:normAutofit fontScale="92500" lnSpcReduction="10000"/>
+          </a:bodyPr>
+          <a:lstStyle/>
+          <a:p>
+            <a:pPr>
+              <a:buFont typeface="Wingdings" panose="05000000000000000000" pitchFamily="2" charset="2"/>
+              <a:buChar char="§"/>
+            </a:pPr>
+            <a:r>
+              <a:rPr lang="en-US" b="1" dirty="0" smtClean="0">
+                <a:solidFill>
+                  <a:srgbClr val="C00000"/>
+                </a:solidFill>
+                <a:latin typeface="Times New Roman" panose="02020603050405020304" pitchFamily="18" charset="0"/>
+                <a:cs typeface="Times New Roman" panose="02020603050405020304" pitchFamily="18" charset="0"/>
+              </a:rPr>
+              <a:t>GFS </a:t>
+            </a:r>
+            <a:r>
+              <a:rPr lang="en-US" b="1" dirty="0" smtClean="0">
+                <a:solidFill>
+                  <a:srgbClr val="C00000"/>
+                </a:solidFill>
+                <a:latin typeface="Times New Roman" panose="02020603050405020304" pitchFamily="18" charset="0"/>
+                <a:cs typeface="Times New Roman" panose="02020603050405020304" pitchFamily="18" charset="0"/>
+              </a:rPr>
+              <a:t>has overall architecture to store all metadata (similar to </a:t>
+            </a:r>
+            <a:r>
+              <a:rPr lang="en-US" b="1" dirty="0" err="1" smtClean="0">
+                <a:solidFill>
+                  <a:srgbClr val="C00000"/>
+                </a:solidFill>
+                <a:latin typeface="Times New Roman" panose="02020603050405020304" pitchFamily="18" charset="0"/>
+                <a:cs typeface="Times New Roman" panose="02020603050405020304" pitchFamily="18" charset="0"/>
+              </a:rPr>
+              <a:t>PostgreSQL’s</a:t>
+            </a:r>
+            <a:r>
+              <a:rPr lang="en-US" b="1" dirty="0" smtClean="0">
+                <a:solidFill>
+                  <a:srgbClr val="C00000"/>
+                </a:solidFill>
+                <a:latin typeface="Times New Roman" panose="02020603050405020304" pitchFamily="18" charset="0"/>
+                <a:cs typeface="Times New Roman" panose="02020603050405020304" pitchFamily="18" charset="0"/>
+              </a:rPr>
+              <a:t> System Catalog, but on a much larger scale) into one master that handles clustered data from chunked locations in its memory.</a:t>
+            </a:r>
+          </a:p>
+          <a:p>
+            <a:pPr>
+              <a:buFont typeface="Wingdings" panose="05000000000000000000" pitchFamily="2" charset="2"/>
+              <a:buChar char="§"/>
+            </a:pPr>
+            <a:r>
+              <a:rPr lang="en-US" b="1" dirty="0" smtClean="0">
+                <a:solidFill>
+                  <a:srgbClr val="C00000"/>
+                </a:solidFill>
+                <a:latin typeface="Times New Roman" panose="02020603050405020304" pitchFamily="18" charset="0"/>
+                <a:cs typeface="Times New Roman" panose="02020603050405020304" pitchFamily="18" charset="0"/>
+              </a:rPr>
+              <a:t>In addition to the single master, multiple </a:t>
+            </a:r>
+            <a:r>
+              <a:rPr lang="en-US" b="1" dirty="0" smtClean="0">
+                <a:solidFill>
+                  <a:srgbClr val="C00000"/>
+                </a:solidFill>
+                <a:latin typeface="Times New Roman" panose="02020603050405020304" pitchFamily="18" charset="0"/>
+                <a:cs typeface="Times New Roman" panose="02020603050405020304" pitchFamily="18" charset="0"/>
+              </a:rPr>
+              <a:t>“</a:t>
+            </a:r>
+            <a:r>
+              <a:rPr lang="en-US" b="1" dirty="0" err="1" smtClean="0">
+                <a:solidFill>
+                  <a:srgbClr val="C00000"/>
+                </a:solidFill>
+                <a:latin typeface="Times New Roman" panose="02020603050405020304" pitchFamily="18" charset="0"/>
+                <a:cs typeface="Times New Roman" panose="02020603050405020304" pitchFamily="18" charset="0"/>
+              </a:rPr>
+              <a:t>chunkservers</a:t>
+            </a:r>
+            <a:r>
+              <a:rPr lang="en-US" b="1" dirty="0" smtClean="0">
+                <a:solidFill>
+                  <a:srgbClr val="C00000"/>
+                </a:solidFill>
+                <a:latin typeface="Times New Roman" panose="02020603050405020304" pitchFamily="18" charset="0"/>
+                <a:cs typeface="Times New Roman" panose="02020603050405020304" pitchFamily="18" charset="0"/>
+              </a:rPr>
+              <a:t>” with a globally unique “64 bit chunk handle” stores local fixed-size files on local disks, holding up to 64 MB of block size for the file system to map to memory—this is much larger than the standard 4-8 KB.</a:t>
+            </a:r>
+            <a:endParaRPr lang="en-US" b="1" dirty="0" smtClean="0">
+              <a:solidFill>
+                <a:srgbClr val="C00000"/>
+              </a:solidFill>
+              <a:latin typeface="Times New Roman" panose="02020603050405020304" pitchFamily="18" charset="0"/>
+              <a:cs typeface="Times New Roman" panose="02020603050405020304" pitchFamily="18" charset="0"/>
+            </a:endParaRPr>
+          </a:p>
+          <a:p>
+            <a:pPr lvl="1">
+              <a:buFont typeface="Wingdings" panose="05000000000000000000" pitchFamily="2" charset="2"/>
+              <a:buChar char="§"/>
+            </a:pPr>
+            <a:r>
+              <a:rPr lang="en-US" b="1" dirty="0" smtClean="0">
+                <a:solidFill>
+                  <a:srgbClr val="C00000"/>
+                </a:solidFill>
+                <a:latin typeface="Times New Roman" panose="02020603050405020304" pitchFamily="18" charset="0"/>
+                <a:cs typeface="Times New Roman" panose="02020603050405020304" pitchFamily="18" charset="0"/>
+              </a:rPr>
+              <a:t>These “chunk locations” are hosted on </a:t>
+            </a:r>
+            <a:r>
+              <a:rPr lang="en-US" b="1" dirty="0" smtClean="0">
+                <a:solidFill>
+                  <a:srgbClr val="C00000"/>
+                </a:solidFill>
+                <a:latin typeface="Times New Roman" panose="02020603050405020304" pitchFamily="18" charset="0"/>
+                <a:cs typeface="Times New Roman" panose="02020603050405020304" pitchFamily="18" charset="0"/>
+              </a:rPr>
+              <a:t>cost-efficient hardware with a Linux-based OS, and they are monitored by “</a:t>
+            </a:r>
+            <a:r>
+              <a:rPr lang="en-US" b="1" dirty="0" err="1" smtClean="0">
+                <a:solidFill>
+                  <a:srgbClr val="C00000"/>
+                </a:solidFill>
+                <a:latin typeface="Times New Roman" panose="02020603050405020304" pitchFamily="18" charset="0"/>
+                <a:cs typeface="Times New Roman" panose="02020603050405020304" pitchFamily="18" charset="0"/>
+              </a:rPr>
+              <a:t>HeartBeat</a:t>
+            </a:r>
+            <a:r>
+              <a:rPr lang="en-US" b="1" dirty="0" smtClean="0">
+                <a:solidFill>
+                  <a:srgbClr val="C00000"/>
+                </a:solidFill>
+                <a:latin typeface="Times New Roman" panose="02020603050405020304" pitchFamily="18" charset="0"/>
+                <a:cs typeface="Times New Roman" panose="02020603050405020304" pitchFamily="18" charset="0"/>
+              </a:rPr>
+              <a:t>” messages to communicate with the host and maintain data consistency. </a:t>
+            </a:r>
+          </a:p>
+          <a:p>
+            <a:pPr lvl="1">
+              <a:buFont typeface="Wingdings" panose="05000000000000000000" pitchFamily="2" charset="2"/>
+              <a:buChar char="§"/>
+            </a:pPr>
+            <a:r>
+              <a:rPr lang="en-US" b="1" dirty="0" smtClean="0">
+                <a:solidFill>
+                  <a:srgbClr val="C00000"/>
+                </a:solidFill>
+                <a:latin typeface="Times New Roman" panose="02020603050405020304" pitchFamily="18" charset="0"/>
+                <a:cs typeface="Times New Roman" panose="02020603050405020304" pitchFamily="18" charset="0"/>
+              </a:rPr>
+              <a:t>Through “</a:t>
+            </a:r>
+            <a:r>
+              <a:rPr lang="en-US" b="1" dirty="0" err="1" smtClean="0">
+                <a:solidFill>
+                  <a:srgbClr val="C00000"/>
+                </a:solidFill>
+                <a:latin typeface="Times New Roman" panose="02020603050405020304" pitchFamily="18" charset="0"/>
+                <a:cs typeface="Times New Roman" panose="02020603050405020304" pitchFamily="18" charset="0"/>
+              </a:rPr>
+              <a:t>checksumming</a:t>
+            </a:r>
+            <a:r>
+              <a:rPr lang="en-US" b="1" dirty="0" smtClean="0">
+                <a:solidFill>
+                  <a:srgbClr val="C00000"/>
+                </a:solidFill>
+                <a:latin typeface="Times New Roman" panose="02020603050405020304" pitchFamily="18" charset="0"/>
+                <a:cs typeface="Times New Roman" panose="02020603050405020304" pitchFamily="18" charset="0"/>
+              </a:rPr>
+              <a:t>” the </a:t>
+            </a:r>
+            <a:r>
+              <a:rPr lang="en-US" b="1" dirty="0" err="1" smtClean="0">
+                <a:solidFill>
+                  <a:srgbClr val="C00000"/>
+                </a:solidFill>
+                <a:latin typeface="Times New Roman" panose="02020603050405020304" pitchFamily="18" charset="0"/>
+                <a:cs typeface="Times New Roman" panose="02020603050405020304" pitchFamily="18" charset="0"/>
+              </a:rPr>
+              <a:t>chunkservers</a:t>
+            </a:r>
+            <a:r>
+              <a:rPr lang="en-US" b="1" dirty="0" smtClean="0">
+                <a:solidFill>
+                  <a:srgbClr val="C00000"/>
+                </a:solidFill>
+                <a:latin typeface="Times New Roman" panose="02020603050405020304" pitchFamily="18" charset="0"/>
+                <a:cs typeface="Times New Roman" panose="02020603050405020304" pitchFamily="18" charset="0"/>
+              </a:rPr>
+              <a:t> can detect corrupt data storage to assure data integrity, based on a precise replications of crucial </a:t>
+            </a:r>
+            <a:r>
+              <a:rPr lang="en-US" b="1" dirty="0">
+                <a:solidFill>
+                  <a:srgbClr val="C00000"/>
+                </a:solidFill>
+                <a:latin typeface="Times New Roman" panose="02020603050405020304" pitchFamily="18" charset="0"/>
+                <a:cs typeface="Times New Roman" panose="02020603050405020304" pitchFamily="18" charset="0"/>
+              </a:rPr>
+              <a:t>data at the disk or IDE subsystem </a:t>
+            </a:r>
+            <a:r>
+              <a:rPr lang="en-US" b="1" dirty="0" smtClean="0">
+                <a:solidFill>
+                  <a:srgbClr val="C00000"/>
+                </a:solidFill>
+                <a:latin typeface="Times New Roman" panose="02020603050405020304" pitchFamily="18" charset="0"/>
+                <a:cs typeface="Times New Roman" panose="02020603050405020304" pitchFamily="18" charset="0"/>
+              </a:rPr>
+              <a:t>level.</a:t>
+            </a:r>
+          </a:p>
+          <a:p>
+            <a:pPr lvl="1">
+              <a:buFont typeface="Wingdings" panose="05000000000000000000" pitchFamily="2" charset="2"/>
+              <a:buChar char="§"/>
+            </a:pPr>
+            <a:r>
+              <a:rPr lang="en-US" b="1" dirty="0" smtClean="0">
+                <a:solidFill>
+                  <a:srgbClr val="C00000"/>
+                </a:solidFill>
+                <a:latin typeface="Times New Roman" panose="02020603050405020304" pitchFamily="18" charset="0"/>
+                <a:cs typeface="Times New Roman" panose="02020603050405020304" pitchFamily="18" charset="0"/>
+              </a:rPr>
+              <a:t>The use of “lazy space allocation” utilizes internal fragmentation to assure no space is wasted within these relatively large chunk sizes.  </a:t>
+            </a:r>
+          </a:p>
+          <a:p>
+            <a:pPr>
+              <a:buFont typeface="Wingdings" panose="05000000000000000000" pitchFamily="2" charset="2"/>
+              <a:buChar char="§"/>
+            </a:pPr>
+            <a:r>
+              <a:rPr lang="en-US" b="1" dirty="0" smtClean="0">
+                <a:solidFill>
+                  <a:srgbClr val="C00000"/>
+                </a:solidFill>
+                <a:latin typeface="Times New Roman" panose="02020603050405020304" pitchFamily="18" charset="0"/>
+                <a:cs typeface="Times New Roman" panose="02020603050405020304" pitchFamily="18" charset="0"/>
+              </a:rPr>
+              <a:t>The master hosts a vast logging mechanic, that consistently tracks all files and chunks. Routine checkpoints are set </a:t>
+            </a:r>
+            <a:r>
+              <a:rPr lang="en-US" b="1" dirty="0" smtClean="0">
+                <a:solidFill>
+                  <a:srgbClr val="C00000"/>
+                </a:solidFill>
+                <a:latin typeface="Times New Roman" panose="02020603050405020304" pitchFamily="18" charset="0"/>
+                <a:cs typeface="Times New Roman" panose="02020603050405020304" pitchFamily="18" charset="0"/>
+              </a:rPr>
+              <a:t>up to maintain the size of the log that compact the given B-Tree directly into memory. </a:t>
+            </a:r>
+            <a:endParaRPr lang="en-US" b="1" dirty="0" smtClean="0">
+              <a:solidFill>
+                <a:srgbClr val="C00000"/>
+              </a:solidFill>
+              <a:latin typeface="Times New Roman" panose="02020603050405020304" pitchFamily="18" charset="0"/>
+              <a:cs typeface="Times New Roman" panose="02020603050405020304" pitchFamily="18" charset="0"/>
+            </a:endParaRPr>
+          </a:p>
+        </p:txBody>
+      </p:sp>
+    </p:spTree>
+    <p:extLst>
+      <p:ext uri="{BB962C8B-B14F-4D97-AF65-F5344CB8AC3E}">
+        <p14:creationId xmlns:p14="http://schemas.microsoft.com/office/powerpoint/2010/main" val="3929134718"/>
+      </p:ext>
+    </p:extLst>
+  </p:cSld>
+  <p:clrMapOvr>
+    <a:masterClrMapping/>
+  </p:clrMapOvr>
+</p:sld>
+</file>
+
+<file path=ppt/slides/slide4.xml><?xml version="1.0" encoding="utf-8"?>
+<p:sld xmlns:a="http://schemas.openxmlformats.org/drawingml/2006/main" xmlns:r="http://schemas.openxmlformats.org/officeDocument/2006/relationships" xmlns:p="http://schemas.openxmlformats.org/presentationml/2006/main">
+  <p:cSld>
+    <p:spTree>
+      <p:nvGrpSpPr>
+        <p:cNvPr id="1" name=""/>
+        <p:cNvGrpSpPr/>
+        <p:nvPr/>
+      </p:nvGrpSpPr>
+      <p:grpSpPr>
+        <a:xfrm>
+          <a:off x="0" y="0"/>
+          <a:ext cx="0" cy="0"/>
+          <a:chOff x="0" y="0"/>
+          <a:chExt cx="0" cy="0"/>
+        </a:xfrm>
+      </p:grpSpPr>
+      <p:sp>
+        <p:nvSpPr>
+          <p:cNvPr id="2" name="Title 1"/>
+          <p:cNvSpPr>
+            <a:spLocks noGrp="1"/>
+          </p:cNvSpPr>
+          <p:nvPr>
+            <p:ph type="title"/>
+          </p:nvPr>
+        </p:nvSpPr>
+        <p:spPr/>
+        <p:txBody>
+          <a:bodyPr/>
+          <a:lstStyle/>
+          <a:p>
+            <a:r>
+              <a:rPr lang="en-US" b="1" i="1" dirty="0" smtClean="0">
+                <a:solidFill>
+                  <a:schemeClr val="bg2">
+                    <a:lumMod val="25000"/>
+                  </a:schemeClr>
+                </a:solidFill>
+              </a:rPr>
+              <a:t>Analysis</a:t>
+            </a:r>
+            <a:r>
+              <a:rPr lang="en-US" b="1" dirty="0" smtClean="0">
+                <a:solidFill>
+                  <a:schemeClr val="bg2">
+                    <a:lumMod val="25000"/>
+                  </a:schemeClr>
+                </a:solidFill>
+              </a:rPr>
+              <a:t>:</a:t>
+            </a:r>
+            <a:endParaRPr lang="en-US" dirty="0"/>
+          </a:p>
+        </p:txBody>
+      </p:sp>
+      <p:sp>
+        <p:nvSpPr>
+          <p:cNvPr id="3" name="Content Placeholder 2"/>
+          <p:cNvSpPr>
+            <a:spLocks noGrp="1"/>
+          </p:cNvSpPr>
+          <p:nvPr>
+            <p:ph idx="1"/>
+          </p:nvPr>
+        </p:nvSpPr>
+        <p:spPr/>
+        <p:txBody>
+          <a:bodyPr/>
+          <a:lstStyle/>
+          <a:p>
+            <a:endParaRPr lang="en-US"/>
+          </a:p>
+        </p:txBody>
+      </p:sp>
+      <p:sp>
+        <p:nvSpPr>
+          <p:cNvPr id="4" name="Rectangle 3"/>
+          <p:cNvSpPr/>
+          <p:nvPr/>
+        </p:nvSpPr>
+        <p:spPr>
+          <a:xfrm>
+            <a:off x="423511" y="1785257"/>
+            <a:ext cx="11405937" cy="4254596"/>
+          </a:xfrm>
+          <a:prstGeom prst="rect">
+            <a:avLst/>
+          </a:prstGeom>
+          <a:solidFill>
+            <a:schemeClr val="bg2">
+              <a:lumMod val="90000"/>
+            </a:schemeClr>
+          </a:solidFill>
+        </p:spPr>
+        <p:style>
+          <a:lnRef idx="1">
+            <a:schemeClr val="accent1"/>
+          </a:lnRef>
+          <a:fillRef idx="2">
+            <a:schemeClr val="accent1"/>
+          </a:fillRef>
+          <a:effectRef idx="1">
+            <a:schemeClr val="accent1"/>
+          </a:effectRef>
+          <a:fontRef idx="minor">
+            <a:schemeClr val="dk1"/>
+          </a:fontRef>
+        </p:style>
+        <p:txBody>
+          <a:bodyPr rtlCol="0" anchor="ctr"/>
+          <a:lstStyle/>
+          <a:p>
+            <a:pPr marL="285750" indent="-285750" algn="ctr">
+              <a:buFont typeface="Arial" panose="020B0604020202020204" pitchFamily="34" charset="0"/>
+              <a:buChar char="•"/>
+            </a:pPr>
+            <a:endParaRPr lang="en-US"/>
+          </a:p>
+        </p:txBody>
+      </p:sp>
+      <p:sp>
+        <p:nvSpPr>
+          <p:cNvPr id="5" name="Content Placeholder 2"/>
+          <p:cNvSpPr txBox="1">
+            <a:spLocks/>
+          </p:cNvSpPr>
+          <p:nvPr/>
+        </p:nvSpPr>
+        <p:spPr>
+          <a:xfrm>
+            <a:off x="1097279" y="1845734"/>
+            <a:ext cx="10732169" cy="4023360"/>
+          </a:xfrm>
+          <a:prstGeom prst="rect">
+            <a:avLst/>
+          </a:prstGeom>
+        </p:spPr>
+        <p:txBody>
+          <a:bodyPr vert="horz" lIns="0" tIns="45720" rIns="0" bIns="45720" rtlCol="0">
+            <a:normAutofit/>
+          </a:bodyPr>
+          <a:lstStyle>
+            <a:lvl1pPr marL="91440" indent="-91440" algn="l" defTabSz="914400" rtl="0" eaLnBrk="1" latinLnBrk="0" hangingPunct="1">
+              <a:lnSpc>
+                <a:spcPct val="90000"/>
+              </a:lnSpc>
+              <a:spcBef>
+                <a:spcPts val="1200"/>
+              </a:spcBef>
+              <a:spcAft>
+                <a:spcPts val="200"/>
+              </a:spcAft>
+              <a:buClr>
+                <a:schemeClr val="accent1"/>
+              </a:buClr>
+              <a:buSzPct val="100000"/>
+              <a:buFont typeface="Calibri" panose="020F0502020204030204" pitchFamily="34" charset="0"/>
+              <a:buChar char=" "/>
+              <a:defRPr sz="2000" kern="1200">
+                <a:solidFill>
+                  <a:schemeClr val="tx1">
+                    <a:lumMod val="75000"/>
+                    <a:lumOff val="25000"/>
+                  </a:schemeClr>
+                </a:solidFill>
+                <a:latin typeface="+mn-lt"/>
+                <a:ea typeface="+mn-ea"/>
+                <a:cs typeface="+mn-cs"/>
+              </a:defRPr>
+            </a:lvl1pPr>
+            <a:lvl2pPr marL="384048" indent="-182880" algn="l" defTabSz="914400" rtl="0" eaLnBrk="1" latinLnBrk="0" hangingPunct="1">
+              <a:lnSpc>
+                <a:spcPct val="90000"/>
+              </a:lnSpc>
+              <a:spcBef>
+                <a:spcPts val="200"/>
+              </a:spcBef>
+              <a:spcAft>
+                <a:spcPts val="400"/>
+              </a:spcAft>
+              <a:buClr>
+                <a:schemeClr val="accent1"/>
+              </a:buClr>
+              <a:buFont typeface="Calibri" pitchFamily="34" charset="0"/>
+              <a:buChar char="◦"/>
+              <a:defRPr sz="1800" kern="1200">
+                <a:solidFill>
+                  <a:schemeClr val="tx1">
+                    <a:lumMod val="75000"/>
+                    <a:lumOff val="25000"/>
+                  </a:schemeClr>
+                </a:solidFill>
+                <a:latin typeface="+mn-lt"/>
+                <a:ea typeface="+mn-ea"/>
+                <a:cs typeface="+mn-cs"/>
+              </a:defRPr>
+            </a:lvl2pPr>
+            <a:lvl3pPr marL="566928" indent="-182880" algn="l" defTabSz="914400" rtl="0" eaLnBrk="1" latinLnBrk="0" hangingPunct="1">
+              <a:lnSpc>
+                <a:spcPct val="90000"/>
+              </a:lnSpc>
+              <a:spcBef>
+                <a:spcPts val="200"/>
+              </a:spcBef>
+              <a:spcAft>
+                <a:spcPts val="400"/>
+              </a:spcAft>
+              <a:buClr>
+                <a:schemeClr val="accent1"/>
+              </a:buClr>
+              <a:buFont typeface="Calibri" pitchFamily="34" charset="0"/>
+              <a:buChar char="◦"/>
+              <a:defRPr sz="1400" kern="1200">
+                <a:solidFill>
+                  <a:schemeClr val="tx1">
+                    <a:lumMod val="75000"/>
+                    <a:lumOff val="25000"/>
+                  </a:schemeClr>
+                </a:solidFill>
+                <a:latin typeface="+mn-lt"/>
+                <a:ea typeface="+mn-ea"/>
+                <a:cs typeface="+mn-cs"/>
+              </a:defRPr>
+            </a:lvl3pPr>
+            <a:lvl4pPr marL="749808" indent="-182880" algn="l" defTabSz="914400" rtl="0" eaLnBrk="1" latinLnBrk="0" hangingPunct="1">
+              <a:lnSpc>
+                <a:spcPct val="90000"/>
+              </a:lnSpc>
+              <a:spcBef>
+                <a:spcPts val="200"/>
+              </a:spcBef>
+              <a:spcAft>
+                <a:spcPts val="400"/>
+              </a:spcAft>
+              <a:buClr>
+                <a:schemeClr val="accent1"/>
+              </a:buClr>
+              <a:buFont typeface="Calibri" pitchFamily="34" charset="0"/>
+              <a:buChar char="◦"/>
+              <a:defRPr sz="1400" kern="1200">
+                <a:solidFill>
+                  <a:schemeClr val="tx1">
+                    <a:lumMod val="75000"/>
+                    <a:lumOff val="25000"/>
+                  </a:schemeClr>
+                </a:solidFill>
+                <a:latin typeface="+mn-lt"/>
+                <a:ea typeface="+mn-ea"/>
+                <a:cs typeface="+mn-cs"/>
+              </a:defRPr>
+            </a:lvl4pPr>
+            <a:lvl5pPr marL="932688" indent="-182880" algn="l" defTabSz="914400" rtl="0" eaLnBrk="1" latinLnBrk="0" hangingPunct="1">
+              <a:lnSpc>
+                <a:spcPct val="90000"/>
+              </a:lnSpc>
+              <a:spcBef>
+                <a:spcPts val="200"/>
+              </a:spcBef>
+              <a:spcAft>
+                <a:spcPts val="400"/>
+              </a:spcAft>
+              <a:buClr>
+                <a:schemeClr val="accent1"/>
+              </a:buClr>
+              <a:buFont typeface="Calibri" pitchFamily="34" charset="0"/>
+              <a:buChar char="◦"/>
+              <a:defRPr sz="1400" kern="1200">
+                <a:solidFill>
+                  <a:schemeClr val="tx1">
+                    <a:lumMod val="75000"/>
+                    <a:lumOff val="25000"/>
+                  </a:schemeClr>
+                </a:solidFill>
+                <a:latin typeface="+mn-lt"/>
+                <a:ea typeface="+mn-ea"/>
+                <a:cs typeface="+mn-cs"/>
+              </a:defRPr>
+            </a:lvl5pPr>
+            <a:lvl6pPr marL="1100000" indent="-228600" algn="l" defTabSz="914400" rtl="0" eaLnBrk="1" latinLnBrk="0" hangingPunct="1">
+              <a:lnSpc>
+                <a:spcPct val="90000"/>
+              </a:lnSpc>
+              <a:spcBef>
+                <a:spcPts val="200"/>
+              </a:spcBef>
+              <a:spcAft>
+                <a:spcPts val="400"/>
+              </a:spcAft>
+              <a:buClr>
+                <a:schemeClr val="accent1"/>
+              </a:buClr>
+              <a:buFont typeface="Calibri" pitchFamily="34" charset="0"/>
+              <a:buChar char="◦"/>
+              <a:defRPr sz="1400" kern="1200">
+                <a:solidFill>
+                  <a:schemeClr val="tx1">
+                    <a:lumMod val="75000"/>
+                    <a:lumOff val="25000"/>
+                  </a:schemeClr>
+                </a:solidFill>
+                <a:latin typeface="+mn-lt"/>
+                <a:ea typeface="+mn-ea"/>
+                <a:cs typeface="+mn-cs"/>
+              </a:defRPr>
+            </a:lvl6pPr>
+            <a:lvl7pPr marL="1300000" indent="-228600" algn="l" defTabSz="914400" rtl="0" eaLnBrk="1" latinLnBrk="0" hangingPunct="1">
+              <a:lnSpc>
+                <a:spcPct val="90000"/>
+              </a:lnSpc>
+              <a:spcBef>
+                <a:spcPts val="200"/>
+              </a:spcBef>
+              <a:spcAft>
+                <a:spcPts val="400"/>
+              </a:spcAft>
+              <a:buClr>
+                <a:schemeClr val="accent1"/>
+              </a:buClr>
+              <a:buFont typeface="Calibri" pitchFamily="34" charset="0"/>
+              <a:buChar char="◦"/>
+              <a:defRPr sz="1400" kern="1200">
+                <a:solidFill>
+                  <a:schemeClr val="tx1">
+                    <a:lumMod val="75000"/>
+                    <a:lumOff val="25000"/>
+                  </a:schemeClr>
+                </a:solidFill>
+                <a:latin typeface="+mn-lt"/>
+                <a:ea typeface="+mn-ea"/>
+                <a:cs typeface="+mn-cs"/>
+              </a:defRPr>
+            </a:lvl7pPr>
+            <a:lvl8pPr marL="1500000" indent="-228600" algn="l" defTabSz="914400" rtl="0" eaLnBrk="1" latinLnBrk="0" hangingPunct="1">
+              <a:lnSpc>
+                <a:spcPct val="90000"/>
+              </a:lnSpc>
+              <a:spcBef>
+                <a:spcPts val="200"/>
+              </a:spcBef>
+              <a:spcAft>
+                <a:spcPts val="400"/>
+              </a:spcAft>
+              <a:buClr>
+                <a:schemeClr val="accent1"/>
+              </a:buClr>
+              <a:buFont typeface="Calibri" pitchFamily="34" charset="0"/>
+              <a:buChar char="◦"/>
+              <a:defRPr sz="1400" kern="1200">
+                <a:solidFill>
+                  <a:schemeClr val="tx1">
+                    <a:lumMod val="75000"/>
+                    <a:lumOff val="25000"/>
+                  </a:schemeClr>
+                </a:solidFill>
+                <a:latin typeface="+mn-lt"/>
+                <a:ea typeface="+mn-ea"/>
+                <a:cs typeface="+mn-cs"/>
+              </a:defRPr>
+            </a:lvl8pPr>
+            <a:lvl9pPr marL="1700000" indent="-228600" algn="l" defTabSz="914400" rtl="0" eaLnBrk="1" latinLnBrk="0" hangingPunct="1">
+              <a:lnSpc>
+                <a:spcPct val="90000"/>
+              </a:lnSpc>
+              <a:spcBef>
+                <a:spcPts val="200"/>
+              </a:spcBef>
+              <a:spcAft>
+                <a:spcPts val="400"/>
+              </a:spcAft>
+              <a:buClr>
+                <a:schemeClr val="accent1"/>
+              </a:buClr>
+              <a:buFont typeface="Calibri" pitchFamily="34" charset="0"/>
+              <a:buChar char="◦"/>
+              <a:defRPr sz="1400" kern="1200">
+                <a:solidFill>
+                  <a:schemeClr val="tx1">
+                    <a:lumMod val="75000"/>
+                    <a:lumOff val="25000"/>
+                  </a:schemeClr>
+                </a:solidFill>
+                <a:latin typeface="+mn-lt"/>
+                <a:ea typeface="+mn-ea"/>
+                <a:cs typeface="+mn-cs"/>
+              </a:defRPr>
+            </a:lvl9pPr>
+          </a:lstStyle>
+          <a:p>
+            <a:pPr>
+              <a:buFont typeface="Wingdings" panose="05000000000000000000" pitchFamily="2" charset="2"/>
+              <a:buChar char="§"/>
+            </a:pPr>
+            <a:r>
+              <a:rPr lang="en-US" b="1" dirty="0" smtClean="0">
+                <a:solidFill>
+                  <a:srgbClr val="C00000"/>
+                </a:solidFill>
+                <a:latin typeface="Times New Roman" panose="02020603050405020304" pitchFamily="18" charset="0"/>
+                <a:cs typeface="Times New Roman" panose="02020603050405020304" pitchFamily="18" charset="0"/>
+              </a:rPr>
+              <a:t>I think that the GFS uses a very scalable system, starting with the use of their master system to monitor the sometimes thousands of disks and machines. </a:t>
+            </a:r>
+          </a:p>
+          <a:p>
+            <a:pPr marL="0" indent="0">
+              <a:buNone/>
+            </a:pPr>
+            <a:endParaRPr lang="en-US" b="1" dirty="0" smtClean="0">
+              <a:solidFill>
+                <a:srgbClr val="C00000"/>
+              </a:solidFill>
+              <a:latin typeface="Times New Roman" panose="02020603050405020304" pitchFamily="18" charset="0"/>
+              <a:cs typeface="Times New Roman" panose="02020603050405020304" pitchFamily="18" charset="0"/>
+            </a:endParaRPr>
+          </a:p>
+          <a:p>
+            <a:pPr>
+              <a:buFont typeface="Wingdings" panose="05000000000000000000" pitchFamily="2" charset="2"/>
+              <a:buChar char="§"/>
+            </a:pPr>
+            <a:r>
+              <a:rPr lang="en-US" b="1" dirty="0" smtClean="0">
+                <a:solidFill>
+                  <a:srgbClr val="C00000"/>
+                </a:solidFill>
+                <a:latin typeface="Times New Roman" panose="02020603050405020304" pitchFamily="18" charset="0"/>
+                <a:cs typeface="Times New Roman" panose="02020603050405020304" pitchFamily="18" charset="0"/>
+              </a:rPr>
+              <a:t>The cost efficient use of hardware systems imbedded with Linux is a valuable asset to this system, as it provides more flexible real-world use cases. Many of these big data systems are built for large enterprise systems, however I think that GFS makes the use of Big Data more accessible and realistic to use. </a:t>
+            </a:r>
+          </a:p>
+          <a:p>
+            <a:pPr lvl="1">
+              <a:buFont typeface="Wingdings" panose="05000000000000000000" pitchFamily="2" charset="2"/>
+              <a:buChar char="§"/>
+            </a:pPr>
+            <a:r>
+              <a:rPr lang="en-US" b="1" dirty="0" smtClean="0">
+                <a:solidFill>
+                  <a:srgbClr val="C00000"/>
+                </a:solidFill>
+                <a:latin typeface="Times New Roman" panose="02020603050405020304" pitchFamily="18" charset="0"/>
+                <a:cs typeface="Times New Roman" panose="02020603050405020304" pitchFamily="18" charset="0"/>
+              </a:rPr>
+              <a:t>Even though this isn’t particularly sold, as it is used as in-house for Google, it is a valuable model for other systems.</a:t>
+            </a:r>
+          </a:p>
+          <a:p>
+            <a:pPr marL="201168" lvl="1" indent="0">
+              <a:buNone/>
+            </a:pPr>
+            <a:endParaRPr lang="en-US" b="1" dirty="0" smtClean="0">
+              <a:solidFill>
+                <a:srgbClr val="C00000"/>
+              </a:solidFill>
+              <a:latin typeface="Times New Roman" panose="02020603050405020304" pitchFamily="18" charset="0"/>
+              <a:cs typeface="Times New Roman" panose="02020603050405020304" pitchFamily="18" charset="0"/>
+            </a:endParaRPr>
+          </a:p>
+          <a:p>
+            <a:pPr>
+              <a:buFont typeface="Wingdings" panose="05000000000000000000" pitchFamily="2" charset="2"/>
+              <a:buChar char="§"/>
+            </a:pPr>
+            <a:r>
+              <a:rPr lang="en-US" b="1" dirty="0" smtClean="0">
+                <a:solidFill>
+                  <a:srgbClr val="C00000"/>
+                </a:solidFill>
+                <a:latin typeface="Times New Roman" panose="02020603050405020304" pitchFamily="18" charset="0"/>
+                <a:cs typeface="Times New Roman" panose="02020603050405020304" pitchFamily="18" charset="0"/>
+              </a:rPr>
+              <a:t>GFS seems to have successful autonomic computing principles, meaning it’s ability to monitor and self-diagnose problems, and this is a massive appeal. </a:t>
+            </a:r>
+          </a:p>
+        </p:txBody>
+      </p:sp>
+    </p:spTree>
+    <p:extLst>
+      <p:ext uri="{BB962C8B-B14F-4D97-AF65-F5344CB8AC3E}">
+        <p14:creationId xmlns:p14="http://schemas.microsoft.com/office/powerpoint/2010/main" val="170283651"/>
+      </p:ext>
+    </p:extLst>
+  </p:cSld>
+  <p:clrMapOvr>
+    <a:masterClrMapping/>
+  </p:clrMapOvr>
+</p:sld>
+</file>
+
+<file path=ppt/slides/slide5.xml><?xml version="1.0" encoding="utf-8"?>
+<p:sld xmlns:a="http://schemas.openxmlformats.org/drawingml/2006/main" xmlns:r="http://schemas.openxmlformats.org/officeDocument/2006/relationships" xmlns:p="http://schemas.openxmlformats.org/presentationml/2006/main">
+  <p:cSld>
+    <p:spTree>
+      <p:nvGrpSpPr>
+        <p:cNvPr id="1" name=""/>
+        <p:cNvGrpSpPr/>
+        <p:nvPr/>
+      </p:nvGrpSpPr>
+      <p:grpSpPr>
+        <a:xfrm>
+          <a:off x="0" y="0"/>
+          <a:ext cx="0" cy="0"/>
+          <a:chOff x="0" y="0"/>
+          <a:chExt cx="0" cy="0"/>
+        </a:xfrm>
+      </p:grpSpPr>
+      <p:sp>
+        <p:nvSpPr>
+          <p:cNvPr id="2" name="Title 1"/>
+          <p:cNvSpPr>
+            <a:spLocks noGrp="1"/>
+          </p:cNvSpPr>
+          <p:nvPr>
+            <p:ph type="title"/>
+          </p:nvPr>
+        </p:nvSpPr>
+        <p:spPr/>
+        <p:txBody>
+          <a:bodyPr>
+            <a:normAutofit/>
+          </a:bodyPr>
+          <a:lstStyle/>
+          <a:p>
+            <a:r>
+              <a:rPr lang="en-US" b="1" dirty="0" smtClean="0">
+                <a:solidFill>
+                  <a:schemeClr val="bg2">
+                    <a:lumMod val="25000"/>
+                  </a:schemeClr>
+                </a:solidFill>
+              </a:rPr>
+              <a:t>Comparison with </a:t>
+            </a:r>
+            <a:r>
+              <a:rPr lang="en-US" i="1" dirty="0"/>
+              <a:t>A Comparison of Approaches to Large-Scale Data </a:t>
+            </a:r>
+            <a:r>
+              <a:rPr lang="en-US" i="1" dirty="0" smtClean="0"/>
+              <a:t>Analysis:</a:t>
+            </a:r>
+            <a:endParaRPr lang="en-US" dirty="0"/>
+          </a:p>
+        </p:txBody>
+      </p:sp>
+      <p:sp>
+        <p:nvSpPr>
+          <p:cNvPr id="3" name="Content Placeholder 2"/>
+          <p:cNvSpPr>
+            <a:spLocks noGrp="1"/>
+          </p:cNvSpPr>
+          <p:nvPr>
+            <p:ph idx="1"/>
+          </p:nvPr>
+        </p:nvSpPr>
+        <p:spPr/>
+        <p:txBody>
+          <a:bodyPr/>
+          <a:lstStyle/>
+          <a:p>
+            <a:endParaRPr lang="en-US" dirty="0"/>
+          </a:p>
+        </p:txBody>
+      </p:sp>
+      <p:sp>
+        <p:nvSpPr>
+          <p:cNvPr id="4" name="Rectangle 3"/>
+          <p:cNvSpPr/>
+          <p:nvPr/>
+        </p:nvSpPr>
+        <p:spPr>
+          <a:xfrm>
+            <a:off x="423511" y="1785257"/>
+            <a:ext cx="11405937" cy="4254596"/>
+          </a:xfrm>
+          <a:prstGeom prst="rect">
+            <a:avLst/>
+          </a:prstGeom>
+          <a:solidFill>
+            <a:schemeClr val="bg2">
+              <a:lumMod val="90000"/>
+            </a:schemeClr>
+          </a:solidFill>
+        </p:spPr>
+        <p:style>
+          <a:lnRef idx="1">
+            <a:schemeClr val="accent1"/>
+          </a:lnRef>
+          <a:fillRef idx="2">
+            <a:schemeClr val="accent1"/>
+          </a:fillRef>
+          <a:effectRef idx="1">
+            <a:schemeClr val="accent1"/>
+          </a:effectRef>
+          <a:fontRef idx="minor">
+            <a:schemeClr val="dk1"/>
+          </a:fontRef>
+        </p:style>
+        <p:txBody>
+          <a:bodyPr rtlCol="0" anchor="ctr"/>
+          <a:lstStyle/>
+          <a:p>
+            <a:pPr marL="285750" indent="-285750" algn="ctr">
+              <a:buFont typeface="Arial" panose="020B0604020202020204" pitchFamily="34" charset="0"/>
+              <a:buChar char="•"/>
+            </a:pPr>
+            <a:endParaRPr lang="en-US"/>
+          </a:p>
+        </p:txBody>
+      </p:sp>
+      <p:sp>
+        <p:nvSpPr>
+          <p:cNvPr id="5" name="Content Placeholder 2"/>
+          <p:cNvSpPr txBox="1">
+            <a:spLocks/>
+          </p:cNvSpPr>
+          <p:nvPr/>
+        </p:nvSpPr>
+        <p:spPr>
+          <a:xfrm>
+            <a:off x="1097279" y="1845734"/>
+            <a:ext cx="10732169" cy="4023360"/>
+          </a:xfrm>
+          <a:prstGeom prst="rect">
+            <a:avLst/>
+          </a:prstGeom>
+        </p:spPr>
+        <p:txBody>
+          <a:bodyPr vert="horz" lIns="0" tIns="45720" rIns="0" bIns="45720" rtlCol="0">
+            <a:normAutofit fontScale="92500" lnSpcReduction="10000"/>
+          </a:bodyPr>
+          <a:lstStyle>
+            <a:lvl1pPr marL="91440" indent="-91440" algn="l" defTabSz="914400" rtl="0" eaLnBrk="1" latinLnBrk="0" hangingPunct="1">
+              <a:lnSpc>
+                <a:spcPct val="90000"/>
+              </a:lnSpc>
+              <a:spcBef>
+                <a:spcPts val="1200"/>
+              </a:spcBef>
+              <a:spcAft>
+                <a:spcPts val="200"/>
+              </a:spcAft>
+              <a:buClr>
+                <a:schemeClr val="accent1"/>
+              </a:buClr>
+              <a:buSzPct val="100000"/>
+              <a:buFont typeface="Calibri" panose="020F0502020204030204" pitchFamily="34" charset="0"/>
+              <a:buChar char=" "/>
+              <a:defRPr sz="2000" kern="1200">
+                <a:solidFill>
+                  <a:schemeClr val="tx1">
+                    <a:lumMod val="75000"/>
+                    <a:lumOff val="25000"/>
+                  </a:schemeClr>
+                </a:solidFill>
+                <a:latin typeface="+mn-lt"/>
+                <a:ea typeface="+mn-ea"/>
+                <a:cs typeface="+mn-cs"/>
+              </a:defRPr>
+            </a:lvl1pPr>
+            <a:lvl2pPr marL="384048" indent="-182880" algn="l" defTabSz="914400" rtl="0" eaLnBrk="1" latinLnBrk="0" hangingPunct="1">
+              <a:lnSpc>
+                <a:spcPct val="90000"/>
+              </a:lnSpc>
+              <a:spcBef>
+                <a:spcPts val="200"/>
+              </a:spcBef>
+              <a:spcAft>
+                <a:spcPts val="400"/>
+              </a:spcAft>
+              <a:buClr>
+                <a:schemeClr val="accent1"/>
+              </a:buClr>
+              <a:buFont typeface="Calibri" pitchFamily="34" charset="0"/>
+              <a:buChar char="◦"/>
+              <a:defRPr sz="1800" kern="1200">
+                <a:solidFill>
+                  <a:schemeClr val="tx1">
+                    <a:lumMod val="75000"/>
+                    <a:lumOff val="25000"/>
+                  </a:schemeClr>
+                </a:solidFill>
+                <a:latin typeface="+mn-lt"/>
+                <a:ea typeface="+mn-ea"/>
+                <a:cs typeface="+mn-cs"/>
+              </a:defRPr>
+            </a:lvl2pPr>
+            <a:lvl3pPr marL="566928" indent="-182880" algn="l" defTabSz="914400" rtl="0" eaLnBrk="1" latinLnBrk="0" hangingPunct="1">
+              <a:lnSpc>
+                <a:spcPct val="90000"/>
+              </a:lnSpc>
+              <a:spcBef>
+                <a:spcPts val="200"/>
+              </a:spcBef>
+              <a:spcAft>
+                <a:spcPts val="400"/>
+              </a:spcAft>
+              <a:buClr>
+                <a:schemeClr val="accent1"/>
+              </a:buClr>
+              <a:buFont typeface="Calibri" pitchFamily="34" charset="0"/>
+              <a:buChar char="◦"/>
+              <a:defRPr sz="1400" kern="1200">
+                <a:solidFill>
+                  <a:schemeClr val="tx1">
+                    <a:lumMod val="75000"/>
+                    <a:lumOff val="25000"/>
+                  </a:schemeClr>
+                </a:solidFill>
+                <a:latin typeface="+mn-lt"/>
+                <a:ea typeface="+mn-ea"/>
+                <a:cs typeface="+mn-cs"/>
+              </a:defRPr>
+            </a:lvl3pPr>
+            <a:lvl4pPr marL="749808" indent="-182880" algn="l" defTabSz="914400" rtl="0" eaLnBrk="1" latinLnBrk="0" hangingPunct="1">
+              <a:lnSpc>
+                <a:spcPct val="90000"/>
+              </a:lnSpc>
+              <a:spcBef>
+                <a:spcPts val="200"/>
+              </a:spcBef>
+              <a:spcAft>
+                <a:spcPts val="400"/>
+              </a:spcAft>
+              <a:buClr>
+                <a:schemeClr val="accent1"/>
+              </a:buClr>
+              <a:buFont typeface="Calibri" pitchFamily="34" charset="0"/>
+              <a:buChar char="◦"/>
+              <a:defRPr sz="1400" kern="1200">
+                <a:solidFill>
+                  <a:schemeClr val="tx1">
+                    <a:lumMod val="75000"/>
+                    <a:lumOff val="25000"/>
+                  </a:schemeClr>
+                </a:solidFill>
+                <a:latin typeface="+mn-lt"/>
+                <a:ea typeface="+mn-ea"/>
+                <a:cs typeface="+mn-cs"/>
+              </a:defRPr>
+            </a:lvl4pPr>
+            <a:lvl5pPr marL="932688" indent="-182880" algn="l" defTabSz="914400" rtl="0" eaLnBrk="1" latinLnBrk="0" hangingPunct="1">
+              <a:lnSpc>
+                <a:spcPct val="90000"/>
+              </a:lnSpc>
+              <a:spcBef>
+                <a:spcPts val="200"/>
+              </a:spcBef>
+              <a:spcAft>
+                <a:spcPts val="400"/>
+              </a:spcAft>
+              <a:buClr>
+                <a:schemeClr val="accent1"/>
+              </a:buClr>
+              <a:buFont typeface="Calibri" pitchFamily="34" charset="0"/>
+              <a:buChar char="◦"/>
+              <a:defRPr sz="1400" kern="1200">
+                <a:solidFill>
+                  <a:schemeClr val="tx1">
+                    <a:lumMod val="75000"/>
+                    <a:lumOff val="25000"/>
+                  </a:schemeClr>
+                </a:solidFill>
+                <a:latin typeface="+mn-lt"/>
+                <a:ea typeface="+mn-ea"/>
+                <a:cs typeface="+mn-cs"/>
+              </a:defRPr>
+            </a:lvl5pPr>
+            <a:lvl6pPr marL="1100000" indent="-228600" algn="l" defTabSz="914400" rtl="0" eaLnBrk="1" latinLnBrk="0" hangingPunct="1">
+              <a:lnSpc>
+                <a:spcPct val="90000"/>
+              </a:lnSpc>
+              <a:spcBef>
+                <a:spcPts val="200"/>
+              </a:spcBef>
+              <a:spcAft>
+                <a:spcPts val="400"/>
+              </a:spcAft>
+              <a:buClr>
+                <a:schemeClr val="accent1"/>
+              </a:buClr>
+              <a:buFont typeface="Calibri" pitchFamily="34" charset="0"/>
+              <a:buChar char="◦"/>
+              <a:defRPr sz="1400" kern="1200">
+                <a:solidFill>
+                  <a:schemeClr val="tx1">
+                    <a:lumMod val="75000"/>
+                    <a:lumOff val="25000"/>
+                  </a:schemeClr>
+                </a:solidFill>
+                <a:latin typeface="+mn-lt"/>
+                <a:ea typeface="+mn-ea"/>
+                <a:cs typeface="+mn-cs"/>
+              </a:defRPr>
+            </a:lvl6pPr>
+            <a:lvl7pPr marL="1300000" indent="-228600" algn="l" defTabSz="914400" rtl="0" eaLnBrk="1" latinLnBrk="0" hangingPunct="1">
+              <a:lnSpc>
+                <a:spcPct val="90000"/>
+              </a:lnSpc>
+              <a:spcBef>
+                <a:spcPts val="200"/>
+              </a:spcBef>
+              <a:spcAft>
+                <a:spcPts val="400"/>
+              </a:spcAft>
+              <a:buClr>
+                <a:schemeClr val="accent1"/>
+              </a:buClr>
+              <a:buFont typeface="Calibri" pitchFamily="34" charset="0"/>
+              <a:buChar char="◦"/>
+              <a:defRPr sz="1400" kern="1200">
+                <a:solidFill>
+                  <a:schemeClr val="tx1">
+                    <a:lumMod val="75000"/>
+                    <a:lumOff val="25000"/>
+                  </a:schemeClr>
+                </a:solidFill>
+                <a:latin typeface="+mn-lt"/>
+                <a:ea typeface="+mn-ea"/>
+                <a:cs typeface="+mn-cs"/>
+              </a:defRPr>
+            </a:lvl7pPr>
+            <a:lvl8pPr marL="1500000" indent="-228600" algn="l" defTabSz="914400" rtl="0" eaLnBrk="1" latinLnBrk="0" hangingPunct="1">
+              <a:lnSpc>
+                <a:spcPct val="90000"/>
+              </a:lnSpc>
+              <a:spcBef>
+                <a:spcPts val="200"/>
+              </a:spcBef>
+              <a:spcAft>
+                <a:spcPts val="400"/>
+              </a:spcAft>
+              <a:buClr>
+                <a:schemeClr val="accent1"/>
+              </a:buClr>
+              <a:buFont typeface="Calibri" pitchFamily="34" charset="0"/>
+              <a:buChar char="◦"/>
+              <a:defRPr sz="1400" kern="1200">
+                <a:solidFill>
+                  <a:schemeClr val="tx1">
+                    <a:lumMod val="75000"/>
+                    <a:lumOff val="25000"/>
+                  </a:schemeClr>
+                </a:solidFill>
+                <a:latin typeface="+mn-lt"/>
+                <a:ea typeface="+mn-ea"/>
+                <a:cs typeface="+mn-cs"/>
+              </a:defRPr>
+            </a:lvl8pPr>
+            <a:lvl9pPr marL="1700000" indent="-228600" algn="l" defTabSz="914400" rtl="0" eaLnBrk="1" latinLnBrk="0" hangingPunct="1">
+              <a:lnSpc>
+                <a:spcPct val="90000"/>
+              </a:lnSpc>
+              <a:spcBef>
+                <a:spcPts val="200"/>
+              </a:spcBef>
+              <a:spcAft>
+                <a:spcPts val="400"/>
+              </a:spcAft>
+              <a:buClr>
+                <a:schemeClr val="accent1"/>
+              </a:buClr>
+              <a:buFont typeface="Calibri" pitchFamily="34" charset="0"/>
+              <a:buChar char="◦"/>
+              <a:defRPr sz="1400" kern="1200">
+                <a:solidFill>
+                  <a:schemeClr val="tx1">
+                    <a:lumMod val="75000"/>
+                    <a:lumOff val="25000"/>
+                  </a:schemeClr>
+                </a:solidFill>
+                <a:latin typeface="+mn-lt"/>
+                <a:ea typeface="+mn-ea"/>
+                <a:cs typeface="+mn-cs"/>
+              </a:defRPr>
+            </a:lvl9pPr>
+          </a:lstStyle>
+          <a:p>
+            <a:pPr>
+              <a:buFont typeface="Wingdings" panose="05000000000000000000" pitchFamily="2" charset="2"/>
+              <a:buChar char="§"/>
+            </a:pPr>
+            <a:r>
+              <a:rPr lang="en-US" b="1" dirty="0" smtClean="0">
+                <a:solidFill>
+                  <a:srgbClr val="C00000"/>
+                </a:solidFill>
+                <a:latin typeface="Times New Roman" panose="02020603050405020304" pitchFamily="18" charset="0"/>
+                <a:cs typeface="Times New Roman" panose="02020603050405020304" pitchFamily="18" charset="0"/>
+              </a:rPr>
+              <a:t>The concept of “cluster computing” is exactly correspondent to GFS…as large number of “low-end servers” are utilized. This can be congruent to the use of “cheap” hardware with Linux OS that are used in GFS.</a:t>
+            </a:r>
+          </a:p>
+          <a:p>
+            <a:pPr>
+              <a:buFont typeface="Wingdings" panose="05000000000000000000" pitchFamily="2" charset="2"/>
+              <a:buChar char="§"/>
+            </a:pPr>
+            <a:endParaRPr lang="en-US" b="1" dirty="0">
+              <a:solidFill>
+                <a:srgbClr val="C00000"/>
+              </a:solidFill>
+              <a:latin typeface="Times New Roman" panose="02020603050405020304" pitchFamily="18" charset="0"/>
+              <a:cs typeface="Times New Roman" panose="02020603050405020304" pitchFamily="18" charset="0"/>
+            </a:endParaRPr>
+          </a:p>
+          <a:p>
+            <a:pPr>
+              <a:buFont typeface="Wingdings" panose="05000000000000000000" pitchFamily="2" charset="2"/>
+              <a:buChar char="§"/>
+            </a:pPr>
+            <a:r>
+              <a:rPr lang="en-US" b="1" dirty="0" smtClean="0">
+                <a:solidFill>
+                  <a:srgbClr val="C00000"/>
+                </a:solidFill>
+                <a:latin typeface="Times New Roman" panose="02020603050405020304" pitchFamily="18" charset="0"/>
+                <a:cs typeface="Times New Roman" panose="02020603050405020304" pitchFamily="18" charset="0"/>
+              </a:rPr>
+              <a:t>The concept of partitioning local data into a shared system, is similar to GFSs </a:t>
+            </a:r>
+            <a:r>
+              <a:rPr lang="en-US" b="1" dirty="0" err="1" smtClean="0">
+                <a:solidFill>
+                  <a:srgbClr val="C00000"/>
+                </a:solidFill>
+                <a:latin typeface="Times New Roman" panose="02020603050405020304" pitchFamily="18" charset="0"/>
+                <a:cs typeface="Times New Roman" panose="02020603050405020304" pitchFamily="18" charset="0"/>
+              </a:rPr>
+              <a:t>clusterservers</a:t>
+            </a:r>
+            <a:r>
+              <a:rPr lang="en-US" b="1" dirty="0" smtClean="0">
+                <a:solidFill>
+                  <a:srgbClr val="C00000"/>
+                </a:solidFill>
+                <a:latin typeface="Times New Roman" panose="02020603050405020304" pitchFamily="18" charset="0"/>
+                <a:cs typeface="Times New Roman" panose="02020603050405020304" pitchFamily="18" charset="0"/>
+              </a:rPr>
+              <a:t> that replicate and parallel onto the main server.  </a:t>
+            </a:r>
+          </a:p>
+          <a:p>
+            <a:pPr>
+              <a:buFont typeface="Wingdings" panose="05000000000000000000" pitchFamily="2" charset="2"/>
+              <a:buChar char="§"/>
+            </a:pPr>
+            <a:endParaRPr lang="en-US" b="1" dirty="0" smtClean="0">
+              <a:solidFill>
+                <a:srgbClr val="C00000"/>
+              </a:solidFill>
+              <a:latin typeface="Times New Roman" panose="02020603050405020304" pitchFamily="18" charset="0"/>
+              <a:cs typeface="Times New Roman" panose="02020603050405020304" pitchFamily="18" charset="0"/>
+            </a:endParaRPr>
+          </a:p>
+          <a:p>
+            <a:pPr>
+              <a:buFont typeface="Wingdings" panose="05000000000000000000" pitchFamily="2" charset="2"/>
+              <a:buChar char="§"/>
+            </a:pPr>
+            <a:r>
+              <a:rPr lang="en-US" b="1" dirty="0" smtClean="0">
+                <a:solidFill>
+                  <a:srgbClr val="C00000"/>
+                </a:solidFill>
+                <a:latin typeface="Times New Roman" panose="02020603050405020304" pitchFamily="18" charset="0"/>
+                <a:cs typeface="Times New Roman" panose="02020603050405020304" pitchFamily="18" charset="0"/>
+              </a:rPr>
+              <a:t>That being said instead of a File system,  the use of parallel relational DBMSs (such as Microsoft SQL Server) are much more advanced then architecture of GFS.</a:t>
+            </a:r>
+          </a:p>
+          <a:p>
+            <a:pPr>
+              <a:buFont typeface="Wingdings" panose="05000000000000000000" pitchFamily="2" charset="2"/>
+              <a:buChar char="§"/>
+            </a:pPr>
+            <a:endParaRPr lang="en-US" b="1" dirty="0">
+              <a:solidFill>
+                <a:srgbClr val="C00000"/>
+              </a:solidFill>
+              <a:latin typeface="Times New Roman" panose="02020603050405020304" pitchFamily="18" charset="0"/>
+              <a:cs typeface="Times New Roman" panose="02020603050405020304" pitchFamily="18" charset="0"/>
+            </a:endParaRPr>
+          </a:p>
+          <a:p>
+            <a:pPr>
+              <a:buFont typeface="Wingdings" panose="05000000000000000000" pitchFamily="2" charset="2"/>
+              <a:buChar char="§"/>
+            </a:pPr>
+            <a:r>
+              <a:rPr lang="en-US" b="1" dirty="0" smtClean="0">
+                <a:solidFill>
+                  <a:srgbClr val="C00000"/>
+                </a:solidFill>
+                <a:latin typeface="Times New Roman" panose="02020603050405020304" pitchFamily="18" charset="0"/>
+                <a:cs typeface="Times New Roman" panose="02020603050405020304" pitchFamily="18" charset="0"/>
+              </a:rPr>
+              <a:t>Both systems also boast fault tolerance and benchmarking capabilities that help produce meaningful metadata.</a:t>
+            </a:r>
+          </a:p>
+          <a:p>
+            <a:pPr marL="0" indent="0">
+              <a:buNone/>
+            </a:pPr>
+            <a:endParaRPr lang="en-US" b="1" dirty="0" smtClean="0">
+              <a:solidFill>
+                <a:srgbClr val="C00000"/>
+              </a:solidFill>
+              <a:latin typeface="Times New Roman" panose="02020603050405020304" pitchFamily="18" charset="0"/>
+              <a:cs typeface="Times New Roman" panose="02020603050405020304" pitchFamily="18" charset="0"/>
+            </a:endParaRPr>
+          </a:p>
+        </p:txBody>
+      </p:sp>
+    </p:spTree>
+    <p:extLst>
+      <p:ext uri="{BB962C8B-B14F-4D97-AF65-F5344CB8AC3E}">
+        <p14:creationId xmlns:p14="http://schemas.microsoft.com/office/powerpoint/2010/main" val="136245284"/>
+      </p:ext>
+    </p:extLst>
+  </p:cSld>
+  <p:clrMapOvr>
+    <a:masterClrMapping/>
+  </p:clrMapOvr>
+</p:sld>
+</file>
+
+<file path=ppt/slides/slide6.xml><?xml version="1.0" encoding="utf-8"?>
+<p:sld xmlns:a="http://schemas.openxmlformats.org/drawingml/2006/main" xmlns:r="http://schemas.openxmlformats.org/officeDocument/2006/relationships" xmlns:p="http://schemas.openxmlformats.org/presentationml/2006/main">
+  <p:cSld>
+    <p:spTree>
+      <p:nvGrpSpPr>
+        <p:cNvPr id="1" name=""/>
+        <p:cNvGrpSpPr/>
+        <p:nvPr/>
+      </p:nvGrpSpPr>
+      <p:grpSpPr>
+        <a:xfrm>
+          <a:off x="0" y="0"/>
+          <a:ext cx="0" cy="0"/>
+          <a:chOff x="0" y="0"/>
+          <a:chExt cx="0" cy="0"/>
+        </a:xfrm>
+      </p:grpSpPr>
+      <p:sp>
+        <p:nvSpPr>
+          <p:cNvPr id="4" name="Rectangle 3"/>
+          <p:cNvSpPr/>
+          <p:nvPr/>
+        </p:nvSpPr>
+        <p:spPr>
+          <a:xfrm>
+            <a:off x="292883" y="1785257"/>
+            <a:ext cx="5702968" cy="4254596"/>
+          </a:xfrm>
+          <a:prstGeom prst="rect">
+            <a:avLst/>
+          </a:prstGeom>
+          <a:solidFill>
+            <a:schemeClr val="bg2">
+              <a:lumMod val="90000"/>
+            </a:schemeClr>
+          </a:solidFill>
+        </p:spPr>
+        <p:style>
+          <a:lnRef idx="1">
+            <a:schemeClr val="accent1"/>
+          </a:lnRef>
+          <a:fillRef idx="2">
+            <a:schemeClr val="accent1"/>
+          </a:fillRef>
+          <a:effectRef idx="1">
+            <a:schemeClr val="accent1"/>
+          </a:effectRef>
+          <a:fontRef idx="minor">
+            <a:schemeClr val="dk1"/>
+          </a:fontRef>
+        </p:style>
+        <p:txBody>
+          <a:bodyPr rtlCol="0" anchor="ctr"/>
+          <a:lstStyle/>
+          <a:p>
+            <a:pPr marL="285750" indent="-285750" algn="ctr">
+              <a:buFont typeface="Arial" panose="020B0604020202020204" pitchFamily="34" charset="0"/>
+              <a:buChar char="•"/>
+            </a:pPr>
+            <a:endParaRPr lang="en-US"/>
+          </a:p>
+        </p:txBody>
+      </p:sp>
+      <p:sp>
+        <p:nvSpPr>
+          <p:cNvPr id="10" name="Rectangle 9"/>
+          <p:cNvSpPr/>
+          <p:nvPr/>
+        </p:nvSpPr>
+        <p:spPr>
+          <a:xfrm>
+            <a:off x="6278880" y="1785257"/>
+            <a:ext cx="5702968" cy="4254596"/>
+          </a:xfrm>
+          <a:prstGeom prst="rect">
+            <a:avLst/>
+          </a:prstGeom>
+        </p:spPr>
+        <p:style>
+          <a:lnRef idx="1">
+            <a:schemeClr val="accent2"/>
+          </a:lnRef>
+          <a:fillRef idx="2">
+            <a:schemeClr val="accent2"/>
+          </a:fillRef>
+          <a:effectRef idx="1">
+            <a:schemeClr val="accent2"/>
+          </a:effectRef>
+          <a:fontRef idx="minor">
+            <a:schemeClr val="dk1"/>
+          </a:fontRef>
+        </p:style>
+        <p:txBody>
+          <a:bodyPr rtlCol="0" anchor="ctr"/>
+          <a:lstStyle/>
+          <a:p>
+            <a:pPr marL="285750" indent="-285750" algn="ctr">
+              <a:buFont typeface="Arial" panose="020B0604020202020204" pitchFamily="34" charset="0"/>
+              <a:buChar char="•"/>
+            </a:pPr>
+            <a:endParaRPr lang="en-US" sz="2000">
+              <a:solidFill>
+                <a:srgbClr val="FF0000"/>
+              </a:solidFill>
+              <a:latin typeface="Times New Roman" panose="02020603050405020304" pitchFamily="18" charset="0"/>
+              <a:cs typeface="Times New Roman" panose="02020603050405020304" pitchFamily="18" charset="0"/>
+            </a:endParaRPr>
+          </a:p>
+        </p:txBody>
+      </p:sp>
+      <p:sp>
+        <p:nvSpPr>
+          <p:cNvPr id="2" name="Title 1"/>
+          <p:cNvSpPr>
+            <a:spLocks noGrp="1"/>
+          </p:cNvSpPr>
+          <p:nvPr>
+            <p:ph type="title"/>
+          </p:nvPr>
+        </p:nvSpPr>
+        <p:spPr/>
+        <p:txBody>
+          <a:bodyPr>
+            <a:normAutofit/>
+          </a:bodyPr>
+          <a:lstStyle/>
+          <a:p>
+            <a:r>
+              <a:rPr lang="en-US" b="1" dirty="0" smtClean="0">
+                <a:solidFill>
+                  <a:schemeClr val="bg2">
+                    <a:lumMod val="25000"/>
+                  </a:schemeClr>
+                </a:solidFill>
+              </a:rPr>
+              <a:t>Advantages and Disadvantages:</a:t>
+            </a:r>
+            <a:endParaRPr lang="en-US" dirty="0"/>
+          </a:p>
+        </p:txBody>
+      </p:sp>
+      <p:sp>
+        <p:nvSpPr>
+          <p:cNvPr id="6" name="Text Placeholder 5"/>
+          <p:cNvSpPr>
+            <a:spLocks noGrp="1"/>
+          </p:cNvSpPr>
+          <p:nvPr>
+            <p:ph type="body" idx="1"/>
+          </p:nvPr>
+        </p:nvSpPr>
+        <p:spPr/>
+        <p:txBody>
+          <a:bodyPr>
+            <a:normAutofit/>
+          </a:bodyPr>
+          <a:lstStyle/>
+          <a:p>
+            <a:r>
+              <a:rPr lang="en-US" b="1" i="1" dirty="0" smtClean="0">
+                <a:solidFill>
+                  <a:schemeClr val="bg2">
+                    <a:lumMod val="25000"/>
+                  </a:schemeClr>
+                </a:solidFill>
+                <a:latin typeface="Times New Roman" panose="02020603050405020304" pitchFamily="18" charset="0"/>
+                <a:cs typeface="Times New Roman" panose="02020603050405020304" pitchFamily="18" charset="0"/>
+              </a:rPr>
+              <a:t>Advantages</a:t>
+            </a:r>
+            <a:r>
+              <a:rPr lang="en-US" dirty="0" smtClean="0">
+                <a:solidFill>
+                  <a:schemeClr val="bg2">
+                    <a:lumMod val="25000"/>
+                  </a:schemeClr>
+                </a:solidFill>
+                <a:latin typeface="Times New Roman" panose="02020603050405020304" pitchFamily="18" charset="0"/>
+                <a:cs typeface="Times New Roman" panose="02020603050405020304" pitchFamily="18" charset="0"/>
+              </a:rPr>
+              <a:t>:</a:t>
+            </a:r>
+            <a:endParaRPr lang="en-US" dirty="0">
+              <a:solidFill>
+                <a:schemeClr val="bg2">
+                  <a:lumMod val="25000"/>
+                </a:schemeClr>
+              </a:solidFill>
+              <a:latin typeface="Times New Roman" panose="02020603050405020304" pitchFamily="18" charset="0"/>
+              <a:cs typeface="Times New Roman" panose="02020603050405020304" pitchFamily="18" charset="0"/>
+            </a:endParaRPr>
+          </a:p>
+        </p:txBody>
+      </p:sp>
+      <p:sp>
+        <p:nvSpPr>
+          <p:cNvPr id="7" name="Content Placeholder 6"/>
+          <p:cNvSpPr>
+            <a:spLocks noGrp="1"/>
+          </p:cNvSpPr>
+          <p:nvPr>
+            <p:ph sz="half" idx="2"/>
+          </p:nvPr>
+        </p:nvSpPr>
+        <p:spPr>
+          <a:xfrm>
+            <a:off x="440870" y="2582334"/>
+            <a:ext cx="5554981" cy="3378200"/>
+          </a:xfrm>
+        </p:spPr>
+        <p:txBody>
+          <a:bodyPr/>
+          <a:lstStyle/>
+          <a:p>
+            <a:pPr>
+              <a:buFont typeface="Wingdings" panose="05000000000000000000" pitchFamily="2" charset="2"/>
+              <a:buChar char="§"/>
+            </a:pPr>
+            <a:r>
+              <a:rPr lang="en-US" b="1" dirty="0" smtClean="0">
+                <a:solidFill>
+                  <a:srgbClr val="C00000"/>
+                </a:solidFill>
+                <a:latin typeface="Times New Roman" panose="02020603050405020304" pitchFamily="18" charset="0"/>
+                <a:cs typeface="Times New Roman" panose="02020603050405020304" pitchFamily="18" charset="0"/>
+              </a:rPr>
+              <a:t> Similar utilization of cluster computing for cost efficient scalability</a:t>
+            </a:r>
+            <a:endParaRPr lang="en-US" sz="1900" b="1" dirty="0" smtClean="0">
+              <a:solidFill>
+                <a:srgbClr val="C00000"/>
+              </a:solidFill>
+              <a:latin typeface="Times New Roman" panose="02020603050405020304" pitchFamily="18" charset="0"/>
+              <a:cs typeface="Times New Roman" panose="02020603050405020304" pitchFamily="18" charset="0"/>
+            </a:endParaRPr>
+          </a:p>
+          <a:p>
+            <a:pPr>
+              <a:buFont typeface="Wingdings" panose="05000000000000000000" pitchFamily="2" charset="2"/>
+              <a:buChar char="§"/>
+            </a:pPr>
+            <a:r>
+              <a:rPr lang="en-US" sz="1900" b="1" dirty="0" smtClean="0">
+                <a:solidFill>
+                  <a:srgbClr val="C00000"/>
+                </a:solidFill>
+                <a:latin typeface="Times New Roman" panose="02020603050405020304" pitchFamily="18" charset="0"/>
+                <a:cs typeface="Times New Roman" panose="02020603050405020304" pitchFamily="18" charset="0"/>
+              </a:rPr>
+              <a:t>Metadata is stored and accessible through a single master, as opposed to parallel DBMS’s MR model</a:t>
+            </a:r>
+            <a:endParaRPr lang="en-US" sz="1900" b="1" dirty="0">
+              <a:solidFill>
+                <a:srgbClr val="C00000"/>
+              </a:solidFill>
+              <a:latin typeface="Times New Roman" panose="02020603050405020304" pitchFamily="18" charset="0"/>
+              <a:cs typeface="Times New Roman" panose="02020603050405020304" pitchFamily="18" charset="0"/>
+            </a:endParaRPr>
+          </a:p>
+          <a:p>
+            <a:pPr>
+              <a:buFont typeface="Wingdings" panose="05000000000000000000" pitchFamily="2" charset="2"/>
+              <a:buChar char="§"/>
+            </a:pPr>
+            <a:r>
+              <a:rPr lang="en-US" sz="1900" b="1" dirty="0" smtClean="0">
+                <a:solidFill>
+                  <a:srgbClr val="C00000"/>
+                </a:solidFill>
+                <a:latin typeface="Times New Roman" panose="02020603050405020304" pitchFamily="18" charset="0"/>
+                <a:cs typeface="Times New Roman" panose="02020603050405020304" pitchFamily="18" charset="0"/>
+              </a:rPr>
+              <a:t>Utilizes B-tree indexing and “Heartbeat” messaging for storage efficient log filing, replication decisions, and data integrity checks. </a:t>
+            </a:r>
+          </a:p>
+          <a:p>
+            <a:pPr>
+              <a:buFont typeface="Wingdings" panose="05000000000000000000" pitchFamily="2" charset="2"/>
+              <a:buChar char="§"/>
+            </a:pPr>
+            <a:r>
+              <a:rPr lang="en-US" sz="1900" b="1" dirty="0" smtClean="0">
+                <a:solidFill>
+                  <a:srgbClr val="C00000"/>
+                </a:solidFill>
+                <a:latin typeface="Times New Roman" panose="02020603050405020304" pitchFamily="18" charset="0"/>
+                <a:cs typeface="Times New Roman" panose="02020603050405020304" pitchFamily="18" charset="0"/>
+              </a:rPr>
+              <a:t>The single master system provides for a strict monitoring of </a:t>
+            </a:r>
+            <a:r>
+              <a:rPr lang="en-US" sz="1900" b="1" dirty="0" err="1" smtClean="0">
+                <a:solidFill>
+                  <a:srgbClr val="C00000"/>
+                </a:solidFill>
+                <a:latin typeface="Times New Roman" panose="02020603050405020304" pitchFamily="18" charset="0"/>
+                <a:cs typeface="Times New Roman" panose="02020603050405020304" pitchFamily="18" charset="0"/>
+              </a:rPr>
+              <a:t>chuckservers</a:t>
+            </a:r>
+            <a:r>
+              <a:rPr lang="en-US" sz="1900" b="1" dirty="0" smtClean="0">
+                <a:solidFill>
+                  <a:srgbClr val="C00000"/>
+                </a:solidFill>
+                <a:latin typeface="Times New Roman" panose="02020603050405020304" pitchFamily="18" charset="0"/>
+                <a:cs typeface="Times New Roman" panose="02020603050405020304" pitchFamily="18" charset="0"/>
+              </a:rPr>
+              <a:t> through checksums and metadata </a:t>
+            </a:r>
+            <a:endParaRPr lang="en-US" sz="1900" b="1" dirty="0">
+              <a:solidFill>
+                <a:srgbClr val="C00000"/>
+              </a:solidFill>
+              <a:latin typeface="Times New Roman" panose="02020603050405020304" pitchFamily="18" charset="0"/>
+              <a:cs typeface="Times New Roman" panose="02020603050405020304" pitchFamily="18" charset="0"/>
+            </a:endParaRPr>
+          </a:p>
+        </p:txBody>
+      </p:sp>
+      <p:sp>
+        <p:nvSpPr>
+          <p:cNvPr id="8" name="Text Placeholder 7"/>
+          <p:cNvSpPr>
+            <a:spLocks noGrp="1"/>
+          </p:cNvSpPr>
+          <p:nvPr>
+            <p:ph type="body" sz="quarter" idx="3"/>
+          </p:nvPr>
+        </p:nvSpPr>
+        <p:spPr>
+          <a:xfrm>
+            <a:off x="7044088" y="1807028"/>
+            <a:ext cx="4937760" cy="736282"/>
+          </a:xfrm>
+        </p:spPr>
+        <p:txBody>
+          <a:bodyPr/>
+          <a:lstStyle/>
+          <a:p>
+            <a:r>
+              <a:rPr lang="en-US" b="1" i="1" dirty="0" smtClean="0">
+                <a:solidFill>
+                  <a:schemeClr val="bg2">
+                    <a:lumMod val="25000"/>
+                  </a:schemeClr>
+                </a:solidFill>
+                <a:latin typeface="Times New Roman" panose="02020603050405020304" pitchFamily="18" charset="0"/>
+                <a:cs typeface="Times New Roman" panose="02020603050405020304" pitchFamily="18" charset="0"/>
+              </a:rPr>
+              <a:t>Disadvantages</a:t>
+            </a:r>
+            <a:r>
+              <a:rPr lang="en-US" dirty="0" smtClean="0">
+                <a:solidFill>
+                  <a:schemeClr val="bg2">
+                    <a:lumMod val="25000"/>
+                  </a:schemeClr>
+                </a:solidFill>
+                <a:latin typeface="Times New Roman" panose="02020603050405020304" pitchFamily="18" charset="0"/>
+                <a:cs typeface="Times New Roman" panose="02020603050405020304" pitchFamily="18" charset="0"/>
+              </a:rPr>
+              <a:t>:</a:t>
+            </a:r>
+            <a:endParaRPr lang="en-US" dirty="0">
+              <a:solidFill>
+                <a:schemeClr val="bg2">
+                  <a:lumMod val="25000"/>
+                </a:schemeClr>
+              </a:solidFill>
+              <a:latin typeface="Times New Roman" panose="02020603050405020304" pitchFamily="18" charset="0"/>
+              <a:cs typeface="Times New Roman" panose="02020603050405020304" pitchFamily="18" charset="0"/>
+            </a:endParaRPr>
+          </a:p>
+        </p:txBody>
+      </p:sp>
+      <p:sp>
+        <p:nvSpPr>
+          <p:cNvPr id="9" name="Content Placeholder 8"/>
+          <p:cNvSpPr>
+            <a:spLocks noGrp="1"/>
+          </p:cNvSpPr>
+          <p:nvPr>
+            <p:ph sz="quarter" idx="4"/>
+          </p:nvPr>
+        </p:nvSpPr>
+        <p:spPr>
+          <a:xfrm>
+            <a:off x="6417128" y="2582334"/>
+            <a:ext cx="5564719" cy="3378200"/>
+          </a:xfrm>
+        </p:spPr>
+        <p:txBody>
+          <a:bodyPr/>
+          <a:lstStyle/>
+          <a:p>
+            <a:pPr>
+              <a:buFont typeface="Wingdings" panose="05000000000000000000" pitchFamily="2" charset="2"/>
+              <a:buChar char="§"/>
+            </a:pPr>
+            <a:r>
+              <a:rPr lang="en-US" b="1" dirty="0" smtClean="0">
+                <a:solidFill>
+                  <a:srgbClr val="002060"/>
+                </a:solidFill>
+                <a:latin typeface="Times New Roman" panose="02020603050405020304" pitchFamily="18" charset="0"/>
+                <a:cs typeface="Times New Roman" panose="02020603050405020304" pitchFamily="18" charset="0"/>
+              </a:rPr>
+              <a:t> The parallel SQL DBMS has the ability to run has querying capabilities </a:t>
+            </a:r>
+            <a:endParaRPr lang="en-US" sz="1900" b="1" dirty="0" smtClean="0">
+              <a:solidFill>
+                <a:srgbClr val="002060"/>
+              </a:solidFill>
+              <a:latin typeface="Times New Roman" panose="02020603050405020304" pitchFamily="18" charset="0"/>
+              <a:cs typeface="Times New Roman" panose="02020603050405020304" pitchFamily="18" charset="0"/>
+            </a:endParaRPr>
+          </a:p>
+          <a:p>
+            <a:pPr>
+              <a:buFont typeface="Wingdings" panose="05000000000000000000" pitchFamily="2" charset="2"/>
+              <a:buChar char="§"/>
+            </a:pPr>
+            <a:r>
+              <a:rPr lang="en-US" sz="1900" b="1" dirty="0" smtClean="0">
+                <a:solidFill>
+                  <a:srgbClr val="002060"/>
+                </a:solidFill>
+                <a:latin typeface="Times New Roman" panose="02020603050405020304" pitchFamily="18" charset="0"/>
+                <a:cs typeface="Times New Roman" panose="02020603050405020304" pitchFamily="18" charset="0"/>
+              </a:rPr>
+              <a:t>Not using complex data architecture and models that make more useful for programming. </a:t>
+            </a:r>
+          </a:p>
+          <a:p>
+            <a:pPr>
+              <a:buFont typeface="Wingdings" panose="05000000000000000000" pitchFamily="2" charset="2"/>
+              <a:buChar char="§"/>
+            </a:pPr>
+            <a:r>
+              <a:rPr lang="en-US" sz="1900" b="1" dirty="0" smtClean="0">
+                <a:solidFill>
+                  <a:srgbClr val="002060"/>
+                </a:solidFill>
+                <a:latin typeface="Times New Roman" panose="02020603050405020304" pitchFamily="18" charset="0"/>
+                <a:cs typeface="Times New Roman" panose="02020603050405020304" pitchFamily="18" charset="0"/>
+              </a:rPr>
+              <a:t>Lack of overall constraints of data distribution, that limits network connections of the nodes to the given cluster</a:t>
+            </a:r>
+          </a:p>
+          <a:p>
+            <a:pPr>
+              <a:buFont typeface="Wingdings" panose="05000000000000000000" pitchFamily="2" charset="2"/>
+              <a:buChar char="§"/>
+            </a:pPr>
+            <a:r>
+              <a:rPr lang="en-US" sz="1900" b="1" dirty="0" smtClean="0">
+                <a:solidFill>
+                  <a:srgbClr val="002060"/>
+                </a:solidFill>
+                <a:latin typeface="Times New Roman" panose="02020603050405020304" pitchFamily="18" charset="0"/>
+                <a:cs typeface="Times New Roman" panose="02020603050405020304" pitchFamily="18" charset="0"/>
+              </a:rPr>
+              <a:t>Lack of flexibility of data use that is used by the parallel DBMS. </a:t>
+            </a:r>
+          </a:p>
+          <a:p>
+            <a:pPr marL="0" indent="0">
+              <a:buNone/>
+            </a:pPr>
+            <a:endParaRPr lang="en-US" sz="1900" dirty="0">
+              <a:solidFill>
+                <a:srgbClr val="C00000"/>
+              </a:solidFill>
+              <a:latin typeface="Times New Roman" panose="02020603050405020304" pitchFamily="18" charset="0"/>
+              <a:cs typeface="Times New Roman" panose="02020603050405020304" pitchFamily="18" charset="0"/>
+            </a:endParaRPr>
+          </a:p>
+          <a:p>
+            <a:endParaRPr lang="en-US" sz="1900" dirty="0">
+              <a:solidFill>
+                <a:srgbClr val="C00000"/>
+              </a:solidFill>
+              <a:latin typeface="Times New Roman" panose="02020603050405020304" pitchFamily="18" charset="0"/>
+              <a:cs typeface="Times New Roman" panose="02020603050405020304" pitchFamily="18" charset="0"/>
+            </a:endParaRPr>
+          </a:p>
+        </p:txBody>
+      </p:sp>
+    </p:spTree>
+    <p:extLst>
+      <p:ext uri="{BB962C8B-B14F-4D97-AF65-F5344CB8AC3E}">
+        <p14:creationId xmlns:p14="http://schemas.microsoft.com/office/powerpoint/2010/main" val="3128508056"/>
       </p:ext>
     </p:extLst>
   </p:cSld>
@@ -4245,7 +6389,7 @@
   <a:extraClrSchemeLst/>
   <a:extLst>
     <a:ext uri="{05A4C25C-085E-4340-85A3-A5531E510DB2}">
-      <thm15:themeFamily xmlns:thm15="http://schemas.microsoft.com/office/thememl/2012/main" name="Retrospect" id="{5F128B03-DCCA-4EEB-AB3B-CF2899314A46}" vid="{3F1AAB62-24C6-49D2-8E01-B56FAC9A3DCD}"/>
+      <thm15:themeFamily xmlns:thm15="http://schemas.microsoft.com/office/thememl/2012/main" xmlns="" name="Retrospect" id="{5F128B03-DCCA-4EEB-AB3B-CF2899314A46}" vid="{3F1AAB62-24C6-49D2-8E01-B56FAC9A3DCD}"/>
     </a:ext>
   </a:extLst>
 </a:theme>

</xml_diff>